<commit_message>
Danny's Teil 3, but still something missing
</commit_message>
<xml_diff>
--- a/Referat_BWP_KG_danny.pptx
+++ b/Referat_BWP_KG_danny.pptx
@@ -9,10 +9,10 @@
     <p:sldId id="256" r:id="rId3"/>
     <p:sldId id="265" r:id="rId4"/>
     <p:sldId id="274" r:id="rId5"/>
-    <p:sldId id="266" r:id="rId6"/>
+    <p:sldId id="276" r:id="rId6"/>
     <p:sldId id="275" r:id="rId7"/>
-    <p:sldId id="267" r:id="rId8"/>
-    <p:sldId id="273" r:id="rId9"/>
+    <p:sldId id="277" r:id="rId8"/>
+    <p:sldId id="278" r:id="rId9"/>
     <p:sldId id="264" r:id="rId10"/>
   </p:sldIdLst>
   <p:sldSz cx="9144000" cy="5143500" type="screen16x9"/>
@@ -4105,7 +4105,7 @@
       </p:sp>
       <p:pic>
         <p:nvPicPr>
-          <p:cNvPr id="1027" name="Picture 3" descr="D:\Schule\BWP\Logo-Wilhelm-Hoyer-logo_wilhelm_hoyer.jpg"/>
+          <p:cNvPr id="1026" name="Picture 2" descr="D:\Schule\BWP\metzgerei.png"/>
           <p:cNvPicPr>
             <a:picLocks noChangeAspect="1" noChangeArrowheads="1"/>
           </p:cNvPicPr>
@@ -4120,8 +4120,8 @@
         </p:blipFill>
         <p:spPr bwMode="auto">
           <a:xfrm>
-            <a:off x="1571604" y="928676"/>
-            <a:ext cx="6074811" cy="3599546"/>
+            <a:off x="1428728" y="785800"/>
+            <a:ext cx="6311894" cy="3786306"/>
           </a:xfrm>
           <a:prstGeom prst="rect">
             <a:avLst/>
@@ -4213,7 +4213,7 @@
                                           </p:stCondLst>
                                         </p:cTn>
                                         <p:tgtEl>
-                                          <p:spTgt spid="1027"/>
+                                          <p:spTgt spid="1026"/>
                                         </p:tgtEl>
                                         <p:attrNameLst>
                                           <p:attrName>style.visibility</p:attrName>
@@ -4285,8 +4285,8 @@
         </p:nvSpPr>
         <p:spPr>
           <a:xfrm>
-            <a:off x="0" y="1357304"/>
-            <a:ext cx="9286908" cy="3139321"/>
+            <a:off x="0" y="1200873"/>
+            <a:ext cx="9286908" cy="2585323"/>
           </a:xfrm>
           <a:prstGeom prst="rect">
             <a:avLst/>
@@ -4311,18 +4311,28 @@
             </a:r>
             <a:r>
               <a:rPr lang="de-DE" dirty="0"/>
-              <a:t>Firmengründung: 1924 </a:t>
-            </a:r>
+              <a:t>Firmengründung: </a:t>
+            </a:r>
+            <a:r>
+              <a:rPr lang="de-DE" dirty="0" smtClean="0"/>
+              <a:t>1958 durch Herrn </a:t>
+            </a:r>
+            <a:r>
+              <a:rPr lang="de-DE" dirty="0" err="1" smtClean="0"/>
+              <a:t>Freyberger</a:t>
+            </a:r>
+            <a:r>
+              <a:rPr lang="de-DE" dirty="0" smtClean="0"/>
+              <a:t> (Opa)</a:t>
+            </a:r>
+            <a:endParaRPr lang="de-DE" dirty="0"/>
           </a:p>
           <a:p>
             <a:pPr>
               <a:buFontTx/>
               <a:buChar char="-"/>
             </a:pPr>
-            <a:r>
-              <a:rPr lang="de-DE" dirty="0"/>
-              <a:t> Hoyer Unternehmensgruppe mittelständisches Mineralölunternehmen</a:t>
-            </a:r>
+            <a:endParaRPr lang="de-DE" dirty="0" smtClean="0"/>
           </a:p>
           <a:p>
             <a:pPr>
@@ -4330,23 +4340,16 @@
               <a:buChar char="-"/>
             </a:pPr>
             <a:r>
-              <a:rPr lang="de-DE" dirty="0"/>
-              <a:t> beschäftigt 1700 Mitarbeiter die sich auf über 100 Standorte verteilen</a:t>
-            </a:r>
+              <a:rPr lang="de-DE" dirty="0" smtClean="0"/>
+              <a:t> Familienunternehmen mit angestellten</a:t>
+            </a:r>
+            <a:endParaRPr lang="de-DE" dirty="0"/>
           </a:p>
           <a:p>
             <a:pPr>
               <a:buFontTx/>
               <a:buChar char="-"/>
             </a:pPr>
-            <a:r>
-              <a:rPr lang="de-DE" dirty="0"/>
-              <a:t> Zentrale und Hauptverwaltung des Unternehmens in </a:t>
-            </a:r>
-            <a:r>
-              <a:rPr lang="de-DE" dirty="0" err="1" smtClean="0"/>
-              <a:t>Visselhövede</a:t>
-            </a:r>
             <a:endParaRPr lang="de-DE" dirty="0" smtClean="0"/>
           </a:p>
           <a:p>
@@ -4356,18 +4359,28 @@
             </a:pPr>
             <a:r>
               <a:rPr lang="de-DE" dirty="0" smtClean="0"/>
-              <a:t> Unternehmensgruppe wird in  vierten Generation geleitet (Familienbetrieb)</a:t>
-            </a:r>
+              <a:t> Geschäftsführer sind Dirk und Sven </a:t>
+            </a:r>
+            <a:r>
+              <a:rPr lang="de-DE" dirty="0" err="1" smtClean="0"/>
+              <a:t>Freyberger</a:t>
+            </a:r>
+            <a:r>
+              <a:rPr lang="de-DE" dirty="0" smtClean="0"/>
+              <a:t> / Kommanditist ist Reiner </a:t>
+            </a:r>
+            <a:r>
+              <a:rPr lang="de-DE" dirty="0" err="1" smtClean="0"/>
+              <a:t>Freyberger</a:t>
+            </a:r>
+            <a:endParaRPr lang="de-DE" dirty="0"/>
           </a:p>
           <a:p>
             <a:pPr>
               <a:buFontTx/>
               <a:buChar char="-"/>
             </a:pPr>
-            <a:r>
-              <a:rPr lang="de-DE" dirty="0" smtClean="0"/>
-              <a:t> Brüder Thomas, Markus und Stefan Hoyer, Eltern Heinz-Wilhelm Hoyer Ulrike Hoyer</a:t>
-            </a:r>
+            <a:endParaRPr lang="de-DE" dirty="0" smtClean="0"/>
           </a:p>
           <a:p>
             <a:pPr>
@@ -4376,7 +4389,15 @@
             </a:pPr>
             <a:r>
               <a:rPr lang="de-DE" dirty="0" smtClean="0"/>
-              <a:t> zusätzlich sechs angestellte Geschäftsführern und zwölf Prokuristen</a:t>
+              <a:t> </a:t>
+            </a:r>
+            <a:r>
+              <a:rPr lang="de-DE" dirty="0" err="1" smtClean="0"/>
+              <a:t>Freyberger</a:t>
+            </a:r>
+            <a:r>
+              <a:rPr lang="de-DE" dirty="0" smtClean="0"/>
+              <a:t> Stammhaus in der Sperberstraße in Nürnberg</a:t>
             </a:r>
           </a:p>
           <a:p>
@@ -4384,10 +4405,7 @@
               <a:buFontTx/>
               <a:buChar char="-"/>
             </a:pPr>
-            <a:r>
-              <a:rPr lang="de-DE" dirty="0" smtClean="0"/>
-              <a:t> versorgt über 250.000 Kunden mit Mineralölprodukten und Flüssiggas</a:t>
-            </a:r>
+            <a:endParaRPr lang="de-DE" dirty="0" smtClean="0"/>
           </a:p>
           <a:p>
             <a:pPr>
@@ -4396,34 +4414,29 @@
             </a:pPr>
             <a:r>
               <a:rPr lang="de-DE" dirty="0" smtClean="0"/>
-              <a:t> Fuhrpark von mehr als 1.000 Fahrzeugen für  Transport, Kran- und Pritschenfahrzeugen     </a:t>
-            </a:r>
-          </a:p>
-          <a:p>
+              <a:t> Weitere Filiale in der </a:t>
+            </a:r>
+            <a:r>
+              <a:rPr lang="de-DE" dirty="0" err="1" smtClean="0"/>
+              <a:t>Katzwanger</a:t>
+            </a:r>
             <a:r>
               <a:rPr lang="de-DE" dirty="0" smtClean="0"/>
-              <a:t>  mobile Tankanlagen und Service sowie Kundendienst- und Montagefahrzeuge</a:t>
-            </a:r>
-          </a:p>
-          <a:p>
-            <a:r>
-              <a:rPr lang="de-DE" dirty="0" smtClean="0"/>
-              <a:t>- 10 eigene Autohöfe und 200 eigene Tankstellen</a:t>
-            </a:r>
-            <a:endParaRPr lang="de-DE" dirty="0"/>
+              <a:t> Hauptstraße in Nürnberg</a:t>
+            </a:r>
           </a:p>
         </p:txBody>
       </p:sp>
       <p:pic>
         <p:nvPicPr>
-          <p:cNvPr id="7" name="Picture 2" descr="D:\Schule\BWP\250px-Hoyer_Unternehmensgruppe_Logo.svg.png"/>
+          <p:cNvPr id="4" name="Picture 2" descr="D:\Schule\BWP\metzgerei.png"/>
           <p:cNvPicPr>
             <a:picLocks noChangeAspect="1" noChangeArrowheads="1"/>
           </p:cNvPicPr>
           <p:nvPr/>
         </p:nvPicPr>
         <p:blipFill>
-          <a:blip r:embed="rId2"/>
+          <a:blip r:embed="rId2" cstate="print"/>
           <a:srcRect/>
           <a:stretch>
             <a:fillRect/>
@@ -4431,8 +4444,8 @@
         </p:blipFill>
         <p:spPr bwMode="auto">
           <a:xfrm>
-            <a:off x="3500430" y="142858"/>
-            <a:ext cx="2286016" cy="896118"/>
+            <a:off x="7429520" y="142858"/>
+            <a:ext cx="1596986" cy="957981"/>
           </a:xfrm>
           <a:prstGeom prst="rect">
             <a:avLst/>
@@ -4530,7 +4543,7 @@
                                         <p:tgtEl>
                                           <p:spTgt spid="5">
                                             <p:txEl>
-                                              <p:pRg st="1" end="1"/>
+                                              <p:pRg st="2" end="2"/>
                                             </p:txEl>
                                           </p:spTgt>
                                         </p:tgtEl>
@@ -4579,7 +4592,7 @@
                                         <p:tgtEl>
                                           <p:spTgt spid="5">
                                             <p:txEl>
-                                              <p:pRg st="2" end="2"/>
+                                              <p:pRg st="4" end="4"/>
                                             </p:txEl>
                                           </p:spTgt>
                                         </p:tgtEl>
@@ -4628,7 +4641,7 @@
                                         <p:tgtEl>
                                           <p:spTgt spid="5">
                                             <p:txEl>
-                                              <p:pRg st="3" end="3"/>
+                                              <p:pRg st="6" end="6"/>
                                             </p:txEl>
                                           </p:spTgt>
                                         </p:tgtEl>
@@ -4677,283 +4690,7 @@
                                         <p:tgtEl>
                                           <p:spTgt spid="5">
                                             <p:txEl>
-                                              <p:pRg st="4" end="4"/>
-                                            </p:txEl>
-                                          </p:spTgt>
-                                        </p:tgtEl>
-                                        <p:attrNameLst>
-                                          <p:attrName>style.visibility</p:attrName>
-                                        </p:attrNameLst>
-                                      </p:cBhvr>
-                                      <p:to>
-                                        <p:strVal val="visible"/>
-                                      </p:to>
-                                    </p:set>
-                                  </p:childTnLst>
-                                </p:cTn>
-                              </p:par>
-                            </p:childTnLst>
-                          </p:cTn>
-                        </p:par>
-                      </p:childTnLst>
-                    </p:cTn>
-                  </p:par>
-                  <p:par>
-                    <p:cTn id="23" fill="hold">
-                      <p:stCondLst>
-                        <p:cond delay="indefinite"/>
-                      </p:stCondLst>
-                      <p:childTnLst>
-                        <p:par>
-                          <p:cTn id="24" fill="hold">
-                            <p:stCondLst>
-                              <p:cond delay="0"/>
-                            </p:stCondLst>
-                            <p:childTnLst>
-                              <p:par>
-                                <p:cTn id="25" presetID="1" presetClass="entr" presetSubtype="0" fill="hold" nodeType="clickEffect">
-                                  <p:stCondLst>
-                                    <p:cond delay="0"/>
-                                  </p:stCondLst>
-                                  <p:childTnLst>
-                                    <p:set>
-                                      <p:cBhvr>
-                                        <p:cTn id="26" dur="1" fill="hold">
-                                          <p:stCondLst>
-                                            <p:cond delay="0"/>
-                                          </p:stCondLst>
-                                        </p:cTn>
-                                        <p:tgtEl>
-                                          <p:spTgt spid="5">
-                                            <p:txEl>
-                                              <p:pRg st="5" end="5"/>
-                                            </p:txEl>
-                                          </p:spTgt>
-                                        </p:tgtEl>
-                                        <p:attrNameLst>
-                                          <p:attrName>style.visibility</p:attrName>
-                                        </p:attrNameLst>
-                                      </p:cBhvr>
-                                      <p:to>
-                                        <p:strVal val="visible"/>
-                                      </p:to>
-                                    </p:set>
-                                  </p:childTnLst>
-                                </p:cTn>
-                              </p:par>
-                            </p:childTnLst>
-                          </p:cTn>
-                        </p:par>
-                      </p:childTnLst>
-                    </p:cTn>
-                  </p:par>
-                  <p:par>
-                    <p:cTn id="27" fill="hold">
-                      <p:stCondLst>
-                        <p:cond delay="indefinite"/>
-                      </p:stCondLst>
-                      <p:childTnLst>
-                        <p:par>
-                          <p:cTn id="28" fill="hold">
-                            <p:stCondLst>
-                              <p:cond delay="0"/>
-                            </p:stCondLst>
-                            <p:childTnLst>
-                              <p:par>
-                                <p:cTn id="29" presetID="1" presetClass="entr" presetSubtype="0" fill="hold" nodeType="clickEffect">
-                                  <p:stCondLst>
-                                    <p:cond delay="0"/>
-                                  </p:stCondLst>
-                                  <p:childTnLst>
-                                    <p:set>
-                                      <p:cBhvr>
-                                        <p:cTn id="30" dur="1" fill="hold">
-                                          <p:stCondLst>
-                                            <p:cond delay="0"/>
-                                          </p:stCondLst>
-                                        </p:cTn>
-                                        <p:tgtEl>
-                                          <p:spTgt spid="5">
-                                            <p:txEl>
-                                              <p:pRg st="6" end="6"/>
-                                            </p:txEl>
-                                          </p:spTgt>
-                                        </p:tgtEl>
-                                        <p:attrNameLst>
-                                          <p:attrName>style.visibility</p:attrName>
-                                        </p:attrNameLst>
-                                      </p:cBhvr>
-                                      <p:to>
-                                        <p:strVal val="visible"/>
-                                      </p:to>
-                                    </p:set>
-                                  </p:childTnLst>
-                                </p:cTn>
-                              </p:par>
-                            </p:childTnLst>
-                          </p:cTn>
-                        </p:par>
-                      </p:childTnLst>
-                    </p:cTn>
-                  </p:par>
-                  <p:par>
-                    <p:cTn id="31" fill="hold">
-                      <p:stCondLst>
-                        <p:cond delay="indefinite"/>
-                      </p:stCondLst>
-                      <p:childTnLst>
-                        <p:par>
-                          <p:cTn id="32" fill="hold">
-                            <p:stCondLst>
-                              <p:cond delay="0"/>
-                            </p:stCondLst>
-                            <p:childTnLst>
-                              <p:par>
-                                <p:cTn id="33" presetID="1" presetClass="entr" presetSubtype="0" fill="hold" nodeType="clickEffect">
-                                  <p:stCondLst>
-                                    <p:cond delay="0"/>
-                                  </p:stCondLst>
-                                  <p:childTnLst>
-                                    <p:set>
-                                      <p:cBhvr>
-                                        <p:cTn id="34" dur="1" fill="hold">
-                                          <p:stCondLst>
-                                            <p:cond delay="0"/>
-                                          </p:stCondLst>
-                                        </p:cTn>
-                                        <p:tgtEl>
-                                          <p:spTgt spid="5">
-                                            <p:txEl>
-                                              <p:pRg st="7" end="7"/>
-                                            </p:txEl>
-                                          </p:spTgt>
-                                        </p:tgtEl>
-                                        <p:attrNameLst>
-                                          <p:attrName>style.visibility</p:attrName>
-                                        </p:attrNameLst>
-                                      </p:cBhvr>
-                                      <p:to>
-                                        <p:strVal val="visible"/>
-                                      </p:to>
-                                    </p:set>
-                                  </p:childTnLst>
-                                </p:cTn>
-                              </p:par>
-                            </p:childTnLst>
-                          </p:cTn>
-                        </p:par>
-                      </p:childTnLst>
-                    </p:cTn>
-                  </p:par>
-                  <p:par>
-                    <p:cTn id="35" fill="hold">
-                      <p:stCondLst>
-                        <p:cond delay="indefinite"/>
-                      </p:stCondLst>
-                      <p:childTnLst>
-                        <p:par>
-                          <p:cTn id="36" fill="hold">
-                            <p:stCondLst>
-                              <p:cond delay="0"/>
-                            </p:stCondLst>
-                            <p:childTnLst>
-                              <p:par>
-                                <p:cTn id="37" presetID="1" presetClass="entr" presetSubtype="0" fill="hold" nodeType="clickEffect">
-                                  <p:stCondLst>
-                                    <p:cond delay="0"/>
-                                  </p:stCondLst>
-                                  <p:childTnLst>
-                                    <p:set>
-                                      <p:cBhvr>
-                                        <p:cTn id="38" dur="1" fill="hold">
-                                          <p:stCondLst>
-                                            <p:cond delay="0"/>
-                                          </p:stCondLst>
-                                        </p:cTn>
-                                        <p:tgtEl>
-                                          <p:spTgt spid="5">
-                                            <p:txEl>
                                               <p:pRg st="8" end="8"/>
-                                            </p:txEl>
-                                          </p:spTgt>
-                                        </p:tgtEl>
-                                        <p:attrNameLst>
-                                          <p:attrName>style.visibility</p:attrName>
-                                        </p:attrNameLst>
-                                      </p:cBhvr>
-                                      <p:to>
-                                        <p:strVal val="visible"/>
-                                      </p:to>
-                                    </p:set>
-                                  </p:childTnLst>
-                                </p:cTn>
-                              </p:par>
-                              <p:par>
-                                <p:cTn id="39" presetID="1" presetClass="entr" presetSubtype="0" fill="hold" nodeType="withEffect">
-                                  <p:stCondLst>
-                                    <p:cond delay="0"/>
-                                  </p:stCondLst>
-                                  <p:childTnLst>
-                                    <p:set>
-                                      <p:cBhvr>
-                                        <p:cTn id="40" dur="1" fill="hold">
-                                          <p:stCondLst>
-                                            <p:cond delay="0"/>
-                                          </p:stCondLst>
-                                        </p:cTn>
-                                        <p:tgtEl>
-                                          <p:spTgt spid="5">
-                                            <p:txEl>
-                                              <p:pRg st="9" end="9"/>
-                                            </p:txEl>
-                                          </p:spTgt>
-                                        </p:tgtEl>
-                                        <p:attrNameLst>
-                                          <p:attrName>style.visibility</p:attrName>
-                                        </p:attrNameLst>
-                                      </p:cBhvr>
-                                      <p:to>
-                                        <p:strVal val="visible"/>
-                                      </p:to>
-                                    </p:set>
-                                  </p:childTnLst>
-                                </p:cTn>
-                              </p:par>
-                            </p:childTnLst>
-                          </p:cTn>
-                        </p:par>
-                      </p:childTnLst>
-                    </p:cTn>
-                  </p:par>
-                  <p:par>
-                    <p:cTn id="41" fill="hold">
-                      <p:stCondLst>
-                        <p:cond delay="indefinite"/>
-                      </p:stCondLst>
-                      <p:childTnLst>
-                        <p:par>
-                          <p:cTn id="42" fill="hold">
-                            <p:stCondLst>
-                              <p:cond delay="0"/>
-                            </p:stCondLst>
-                            <p:childTnLst>
-                              <p:par>
-                                <p:cTn id="43" presetID="1" presetClass="entr" presetSubtype="0" fill="hold" nodeType="clickEffect">
-                                  <p:stCondLst>
-                                    <p:cond delay="0"/>
-                                  </p:stCondLst>
-                                  <p:childTnLst>
-                                    <p:set>
-                                      <p:cBhvr>
-                                        <p:cTn id="44" dur="1" fill="hold">
-                                          <p:stCondLst>
-                                            <p:cond delay="0"/>
-                                          </p:stCondLst>
-                                        </p:cTn>
-                                        <p:tgtEl>
-                                          <p:spTgt spid="5">
-                                            <p:txEl>
-                                              <p:pRg st="10" end="10"/>
                                             </p:txEl>
                                           </p:spTgt>
                                         </p:tgtEl>
@@ -5016,16 +4753,146 @@
           <a:chExt cx="0" cy="0"/>
         </a:xfrm>
       </p:grpSpPr>
+      <p:sp>
+        <p:nvSpPr>
+          <p:cNvPr id="5" name="Textfeld 4"/>
+          <p:cNvSpPr txBox="1"/>
+          <p:nvPr/>
+        </p:nvSpPr>
+        <p:spPr>
+          <a:xfrm>
+            <a:off x="0" y="1200873"/>
+            <a:ext cx="9144000" cy="2585323"/>
+          </a:xfrm>
+          <a:prstGeom prst="rect">
+            <a:avLst/>
+          </a:prstGeom>
+          <a:noFill/>
+        </p:spPr>
+        <p:txBody>
+          <a:bodyPr wrap="square" rtlCol="0">
+            <a:spAutoFit/>
+          </a:bodyPr>
+          <a:lstStyle/>
+          <a:p>
+            <a:pPr>
+              <a:buFontTx/>
+              <a:buChar char="-"/>
+            </a:pPr>
+            <a:r>
+              <a:rPr lang="de-DE" spc="-1" dirty="0" smtClean="0">
+                <a:solidFill>
+                  <a:srgbClr val="000000"/>
+                </a:solidFill>
+                <a:latin typeface="Arial"/>
+                <a:ea typeface="DejaVu Sans"/>
+              </a:rPr>
+              <a:t> Produkte </a:t>
+            </a:r>
+            <a:r>
+              <a:rPr lang="de-DE" spc="-1" dirty="0" smtClean="0">
+                <a:solidFill>
+                  <a:srgbClr val="000000"/>
+                </a:solidFill>
+                <a:latin typeface="Arial"/>
+                <a:ea typeface="DejaVu Sans"/>
+              </a:rPr>
+              <a:t>werden in Handarbeit hergestellt</a:t>
+            </a:r>
+          </a:p>
+          <a:p>
+            <a:pPr>
+              <a:buFontTx/>
+              <a:buChar char="-"/>
+            </a:pPr>
+            <a:endParaRPr lang="de-DE" spc="-1" dirty="0" smtClean="0">
+              <a:solidFill>
+                <a:srgbClr val="000000"/>
+              </a:solidFill>
+              <a:latin typeface="Arial"/>
+            </a:endParaRPr>
+          </a:p>
+          <a:p>
+            <a:pPr>
+              <a:buFontTx/>
+              <a:buChar char="-"/>
+            </a:pPr>
+            <a:r>
+              <a:rPr lang="de-DE" spc="-1" dirty="0" smtClean="0">
+                <a:solidFill>
+                  <a:srgbClr val="000000"/>
+                </a:solidFill>
+                <a:latin typeface="Arial"/>
+              </a:rPr>
+              <a:t> täglich wechselnde Mittagsmenüs </a:t>
+            </a:r>
+            <a:endParaRPr lang="de-DE" dirty="0"/>
+          </a:p>
+          <a:p>
+            <a:pPr>
+              <a:buFontTx/>
+              <a:buChar char="-"/>
+            </a:pPr>
+            <a:endParaRPr lang="de-DE" dirty="0" smtClean="0"/>
+          </a:p>
+          <a:p>
+            <a:pPr>
+              <a:buFontTx/>
+              <a:buChar char="-"/>
+            </a:pPr>
+            <a:r>
+              <a:rPr lang="de-DE" dirty="0" smtClean="0"/>
+              <a:t> zusätzlichen Catering Service für Messen und Veranstaltungen</a:t>
+            </a:r>
+          </a:p>
+          <a:p>
+            <a:pPr>
+              <a:buFontTx/>
+              <a:buChar char="-"/>
+            </a:pPr>
+            <a:endParaRPr lang="de-DE" dirty="0" smtClean="0"/>
+          </a:p>
+          <a:p>
+            <a:pPr>
+              <a:buFontTx/>
+              <a:buChar char="-"/>
+            </a:pPr>
+            <a:r>
+              <a:rPr lang="de-DE" dirty="0" smtClean="0"/>
+              <a:t> Essen auf Rädern für Privat-Haushalte oder Firmen</a:t>
+            </a:r>
+            <a:endParaRPr lang="de-DE" dirty="0"/>
+          </a:p>
+          <a:p>
+            <a:pPr>
+              <a:buFontTx/>
+              <a:buChar char="-"/>
+            </a:pPr>
+            <a:endParaRPr lang="de-DE" dirty="0" smtClean="0"/>
+          </a:p>
+          <a:p>
+            <a:pPr>
+              <a:buFontTx/>
+              <a:buChar char="-"/>
+            </a:pPr>
+            <a:r>
+              <a:rPr lang="de-DE" dirty="0" smtClean="0"/>
+              <a:t> Grillseminare für Einsteiger, Umsteiger und Enthusiasten</a:t>
+            </a:r>
+            <a:endParaRPr lang="de-DE" dirty="0"/>
+          </a:p>
+        </p:txBody>
+      </p:sp>
       <p:pic>
         <p:nvPicPr>
-          <p:cNvPr id="4" name="Picture 2" descr="D:\Schule\BWP\250px-Hoyer_Unternehmensgruppe_Logo.svg.png"/>
+          <p:cNvPr id="4" name="Picture 2" descr="D:\Schule\BWP\metzgerei.png"/>
           <p:cNvPicPr>
             <a:picLocks noChangeAspect="1" noChangeArrowheads="1"/>
           </p:cNvPicPr>
           <p:nvPr/>
         </p:nvPicPr>
         <p:blipFill>
-          <a:blip r:embed="rId2"/>
+          <a:blip r:embed="rId2" cstate="print"/>
           <a:srcRect/>
           <a:stretch>
             <a:fillRect/>
@@ -5033,8 +4900,8 @@
         </p:blipFill>
         <p:spPr bwMode="auto">
           <a:xfrm>
-            <a:off x="3500430" y="142858"/>
-            <a:ext cx="2286016" cy="896118"/>
+            <a:off x="7429520" y="142858"/>
+            <a:ext cx="1596986" cy="957981"/>
           </a:xfrm>
           <a:prstGeom prst="rect">
             <a:avLst/>
@@ -5042,156 +4909,6 @@
           <a:noFill/>
         </p:spPr>
       </p:pic>
-      <p:sp>
-        <p:nvSpPr>
-          <p:cNvPr id="8" name="Textfeld 7"/>
-          <p:cNvSpPr txBox="1"/>
-          <p:nvPr/>
-        </p:nvSpPr>
-        <p:spPr>
-          <a:xfrm>
-            <a:off x="0" y="1214428"/>
-            <a:ext cx="9144000" cy="3016210"/>
-          </a:xfrm>
-          <a:prstGeom prst="rect">
-            <a:avLst/>
-          </a:prstGeom>
-          <a:noFill/>
-        </p:spPr>
-        <p:txBody>
-          <a:bodyPr wrap="square" rtlCol="0">
-            <a:spAutoFit/>
-          </a:bodyPr>
-          <a:lstStyle/>
-          <a:p>
-            <a:pPr algn="ctr"/>
-            <a:r>
-              <a:rPr lang="de-DE" sz="2800" b="1" spc="-1" dirty="0" smtClean="0">
-                <a:solidFill>
-                  <a:srgbClr val="003259"/>
-                </a:solidFill>
-                <a:latin typeface="Arial"/>
-                <a:ea typeface="DejaVu Sans"/>
-              </a:rPr>
-              <a:t>Unternehmensbericht </a:t>
-            </a:r>
-            <a:r>
-              <a:rPr lang="de-DE" sz="2800" b="1" spc="-1" dirty="0" smtClean="0">
-                <a:solidFill>
-                  <a:srgbClr val="003259"/>
-                </a:solidFill>
-                <a:latin typeface="Arial"/>
-                <a:ea typeface="DejaVu Sans"/>
-              </a:rPr>
-              <a:t>2018</a:t>
-            </a:r>
-            <a:endParaRPr lang="de-DE" b="1" spc="-1" dirty="0" smtClean="0">
-              <a:solidFill>
-                <a:srgbClr val="003259"/>
-              </a:solidFill>
-              <a:latin typeface="Arial"/>
-              <a:ea typeface="DejaVu Sans"/>
-            </a:endParaRPr>
-          </a:p>
-          <a:p>
-            <a:endParaRPr lang="de-DE" dirty="0" smtClean="0"/>
-          </a:p>
-          <a:p>
-            <a:endParaRPr lang="de-DE" dirty="0" smtClean="0"/>
-          </a:p>
-          <a:p>
-            <a:r>
-              <a:rPr lang="de-DE" dirty="0" smtClean="0"/>
-              <a:t>Umsatz</a:t>
-            </a:r>
-            <a:r>
-              <a:rPr lang="de-DE" dirty="0" smtClean="0"/>
-              <a:t>: </a:t>
-            </a:r>
-            <a:r>
-              <a:rPr lang="de-DE" dirty="0" smtClean="0"/>
-              <a:t>1.166.869 €                                                </a:t>
-            </a:r>
-          </a:p>
-          <a:p>
-            <a:r>
-              <a:rPr lang="de-DE" dirty="0" smtClean="0"/>
-              <a:t>Ergebnis vor Ertragssteuer(EBT): 40.218 €          </a:t>
-            </a:r>
-          </a:p>
-          <a:p>
-            <a:r>
-              <a:rPr lang="de-DE" dirty="0" smtClean="0"/>
-              <a:t>EBIT: 45.387 €                                                        </a:t>
-            </a:r>
-          </a:p>
-          <a:p>
-            <a:r>
-              <a:rPr lang="de-DE" dirty="0" smtClean="0"/>
-              <a:t>EBITDA: 106.675 €</a:t>
-            </a:r>
-          </a:p>
-          <a:p>
-            <a:endParaRPr lang="de-DE" dirty="0" smtClean="0"/>
-          </a:p>
-          <a:p>
-            <a:pPr algn="ctr"/>
-            <a:r>
-              <a:rPr lang="de-DE" dirty="0" smtClean="0"/>
-              <a:t>Umsatzrentabilität (vor Steuer): 3,4 %</a:t>
-            </a:r>
-          </a:p>
-          <a:p>
-            <a:pPr algn="ctr"/>
-            <a:r>
-              <a:rPr lang="de-DE" dirty="0" smtClean="0"/>
-              <a:t>Gesamtkapitalrentabilität (ROCE): 7,6 %</a:t>
-            </a:r>
-            <a:endParaRPr lang="de-DE" dirty="0" smtClean="0"/>
-          </a:p>
-        </p:txBody>
-      </p:sp>
-      <p:sp>
-        <p:nvSpPr>
-          <p:cNvPr id="9" name="Textfeld 8"/>
-          <p:cNvSpPr txBox="1"/>
-          <p:nvPr/>
-        </p:nvSpPr>
-        <p:spPr>
-          <a:xfrm>
-            <a:off x="5929322" y="2143122"/>
-            <a:ext cx="2786082" cy="923330"/>
-          </a:xfrm>
-          <a:prstGeom prst="rect">
-            <a:avLst/>
-          </a:prstGeom>
-          <a:noFill/>
-        </p:spPr>
-        <p:txBody>
-          <a:bodyPr wrap="square" rtlCol="0">
-            <a:spAutoFit/>
-          </a:bodyPr>
-          <a:lstStyle/>
-          <a:p>
-            <a:r>
-              <a:rPr lang="de-DE" dirty="0" smtClean="0"/>
-              <a:t>Eigenkapital: 355.360 €</a:t>
-            </a:r>
-          </a:p>
-          <a:p>
-            <a:r>
-              <a:rPr lang="de-DE" dirty="0" smtClean="0"/>
-              <a:t>Eigenkapitalquote: 44 %</a:t>
-            </a:r>
-          </a:p>
-          <a:p>
-            <a:r>
-              <a:rPr lang="de-DE" dirty="0" smtClean="0"/>
-              <a:t>Bilanzsumme: 816.160 €</a:t>
-            </a:r>
-          </a:p>
-        </p:txBody>
-      </p:sp>
     </p:spTree>
   </p:cSld>
   <p:clrMapOvr>
@@ -5231,7 +4948,7 @@
                                           </p:stCondLst>
                                         </p:cTn>
                                         <p:tgtEl>
-                                          <p:spTgt spid="8">
+                                          <p:spTgt spid="5">
                                             <p:txEl>
                                               <p:pRg st="0" end="0"/>
                                             </p:txEl>
@@ -5280,9 +4997,9 @@
                                           </p:stCondLst>
                                         </p:cTn>
                                         <p:tgtEl>
-                                          <p:spTgt spid="8">
+                                          <p:spTgt spid="5">
                                             <p:txEl>
-                                              <p:pRg st="3" end="3"/>
+                                              <p:pRg st="2" end="2"/>
                                             </p:txEl>
                                           </p:spTgt>
                                         </p:tgtEl>
@@ -5297,21 +5014,39 @@
                                   </p:childTnLst>
                                 </p:cTn>
                               </p:par>
+                            </p:childTnLst>
+                          </p:cTn>
+                        </p:par>
+                      </p:childTnLst>
+                    </p:cTn>
+                  </p:par>
+                  <p:par>
+                    <p:cTn id="11" fill="hold">
+                      <p:stCondLst>
+                        <p:cond delay="indefinite"/>
+                      </p:stCondLst>
+                      <p:childTnLst>
+                        <p:par>
+                          <p:cTn id="12" fill="hold">
+                            <p:stCondLst>
+                              <p:cond delay="0"/>
+                            </p:stCondLst>
+                            <p:childTnLst>
                               <p:par>
-                                <p:cTn id="11" presetID="1" presetClass="entr" presetSubtype="0" fill="hold" nodeType="withEffect">
+                                <p:cTn id="13" presetID="1" presetClass="entr" presetSubtype="0" fill="hold" nodeType="clickEffect">
                                   <p:stCondLst>
                                     <p:cond delay="0"/>
                                   </p:stCondLst>
                                   <p:childTnLst>
                                     <p:set>
                                       <p:cBhvr>
-                                        <p:cTn id="12" dur="1" fill="hold">
+                                        <p:cTn id="14" dur="1" fill="hold">
                                           <p:stCondLst>
                                             <p:cond delay="0"/>
                                           </p:stCondLst>
                                         </p:cTn>
                                         <p:tgtEl>
-                                          <p:spTgt spid="8">
+                                          <p:spTgt spid="5">
                                             <p:txEl>
                                               <p:pRg st="4" end="4"/>
                                             </p:txEl>
@@ -5328,52 +5063,39 @@
                                   </p:childTnLst>
                                 </p:cTn>
                               </p:par>
+                            </p:childTnLst>
+                          </p:cTn>
+                        </p:par>
+                      </p:childTnLst>
+                    </p:cTn>
+                  </p:par>
+                  <p:par>
+                    <p:cTn id="15" fill="hold">
+                      <p:stCondLst>
+                        <p:cond delay="indefinite"/>
+                      </p:stCondLst>
+                      <p:childTnLst>
+                        <p:par>
+                          <p:cTn id="16" fill="hold">
+                            <p:stCondLst>
+                              <p:cond delay="0"/>
+                            </p:stCondLst>
+                            <p:childTnLst>
                               <p:par>
-                                <p:cTn id="13" presetID="1" presetClass="entr" presetSubtype="0" fill="hold" nodeType="withEffect">
+                                <p:cTn id="17" presetID="1" presetClass="entr" presetSubtype="0" fill="hold" nodeType="clickEffect">
                                   <p:stCondLst>
                                     <p:cond delay="0"/>
                                   </p:stCondLst>
                                   <p:childTnLst>
                                     <p:set>
                                       <p:cBhvr>
-                                        <p:cTn id="14" dur="1" fill="hold">
+                                        <p:cTn id="18" dur="1" fill="hold">
                                           <p:stCondLst>
                                             <p:cond delay="0"/>
                                           </p:stCondLst>
                                         </p:cTn>
                                         <p:tgtEl>
-                                          <p:spTgt spid="8">
-                                            <p:txEl>
-                                              <p:pRg st="5" end="5"/>
-                                            </p:txEl>
-                                          </p:spTgt>
-                                        </p:tgtEl>
-                                        <p:attrNameLst>
-                                          <p:attrName>style.visibility</p:attrName>
-                                        </p:attrNameLst>
-                                      </p:cBhvr>
-                                      <p:to>
-                                        <p:strVal val="visible"/>
-                                      </p:to>
-                                    </p:set>
-                                  </p:childTnLst>
-                                </p:cTn>
-                              </p:par>
-                              <p:par>
-                                <p:cTn id="15" presetID="1" presetClass="entr" presetSubtype="0" fill="hold" nodeType="withEffect">
-                                  <p:stCondLst>
-                                    <p:cond delay="0"/>
-                                  </p:stCondLst>
-                                  <p:childTnLst>
-                                    <p:set>
-                                      <p:cBhvr>
-                                        <p:cTn id="16" dur="1" fill="hold">
-                                          <p:stCondLst>
-                                            <p:cond delay="0"/>
-                                          </p:stCondLst>
-                                        </p:cTn>
-                                        <p:tgtEl>
-                                          <p:spTgt spid="8">
+                                          <p:spTgt spid="5">
                                             <p:txEl>
                                               <p:pRg st="6" end="6"/>
                                             </p:txEl>
@@ -5397,50 +5119,19 @@
                     </p:cTn>
                   </p:par>
                   <p:par>
-                    <p:cTn id="17" fill="hold">
+                    <p:cTn id="19" fill="hold">
                       <p:stCondLst>
                         <p:cond delay="indefinite"/>
                       </p:stCondLst>
                       <p:childTnLst>
                         <p:par>
-                          <p:cTn id="18" fill="hold">
+                          <p:cTn id="20" fill="hold">
                             <p:stCondLst>
                               <p:cond delay="0"/>
                             </p:stCondLst>
                             <p:childTnLst>
                               <p:par>
-                                <p:cTn id="19" presetID="1" presetClass="entr" presetSubtype="0" fill="hold" nodeType="clickEffect">
-                                  <p:stCondLst>
-                                    <p:cond delay="0"/>
-                                  </p:stCondLst>
-                                  <p:childTnLst>
-                                    <p:set>
-                                      <p:cBhvr>
-                                        <p:cTn id="20" dur="1" fill="hold">
-                                          <p:stCondLst>
-                                            <p:cond delay="0"/>
-                                          </p:stCondLst>
-                                        </p:cTn>
-                                        <p:tgtEl>
-                                          <p:spTgt spid="9">
-                                            <p:txEl>
-                                              <p:pRg st="0" end="0"/>
-                                            </p:txEl>
-                                          </p:spTgt>
-                                        </p:tgtEl>
-                                        <p:attrNameLst>
-                                          <p:attrName>style.visibility</p:attrName>
-                                        </p:attrNameLst>
-                                      </p:cBhvr>
-                                      <p:to>
-                                        <p:strVal val="visible"/>
-                                      </p:to>
-                                    </p:set>
-                                  </p:childTnLst>
-                                </p:cTn>
-                              </p:par>
-                              <p:par>
-                                <p:cTn id="21" presetID="1" presetClass="entr" presetSubtype="0" fill="hold" nodeType="withEffect">
+                                <p:cTn id="21" presetID="1" presetClass="entr" presetSubtype="0" fill="hold" nodeType="clickEffect">
                                   <p:stCondLst>
                                     <p:cond delay="0"/>
                                   </p:stCondLst>
@@ -5453,120 +5144,9 @@
                                           </p:stCondLst>
                                         </p:cTn>
                                         <p:tgtEl>
-                                          <p:spTgt spid="9">
-                                            <p:txEl>
-                                              <p:pRg st="1" end="1"/>
-                                            </p:txEl>
-                                          </p:spTgt>
-                                        </p:tgtEl>
-                                        <p:attrNameLst>
-                                          <p:attrName>style.visibility</p:attrName>
-                                        </p:attrNameLst>
-                                      </p:cBhvr>
-                                      <p:to>
-                                        <p:strVal val="visible"/>
-                                      </p:to>
-                                    </p:set>
-                                  </p:childTnLst>
-                                </p:cTn>
-                              </p:par>
-                              <p:par>
-                                <p:cTn id="23" presetID="1" presetClass="entr" presetSubtype="0" fill="hold" nodeType="withEffect">
-                                  <p:stCondLst>
-                                    <p:cond delay="0"/>
-                                  </p:stCondLst>
-                                  <p:childTnLst>
-                                    <p:set>
-                                      <p:cBhvr>
-                                        <p:cTn id="24" dur="1" fill="hold">
-                                          <p:stCondLst>
-                                            <p:cond delay="0"/>
-                                          </p:stCondLst>
-                                        </p:cTn>
-                                        <p:tgtEl>
-                                          <p:spTgt spid="9">
-                                            <p:txEl>
-                                              <p:pRg st="2" end="2"/>
-                                            </p:txEl>
-                                          </p:spTgt>
-                                        </p:tgtEl>
-                                        <p:attrNameLst>
-                                          <p:attrName>style.visibility</p:attrName>
-                                        </p:attrNameLst>
-                                      </p:cBhvr>
-                                      <p:to>
-                                        <p:strVal val="visible"/>
-                                      </p:to>
-                                    </p:set>
-                                  </p:childTnLst>
-                                </p:cTn>
-                              </p:par>
-                            </p:childTnLst>
-                          </p:cTn>
-                        </p:par>
-                      </p:childTnLst>
-                    </p:cTn>
-                  </p:par>
-                  <p:par>
-                    <p:cTn id="25" fill="hold">
-                      <p:stCondLst>
-                        <p:cond delay="indefinite"/>
-                      </p:stCondLst>
-                      <p:childTnLst>
-                        <p:par>
-                          <p:cTn id="26" fill="hold">
-                            <p:stCondLst>
-                              <p:cond delay="0"/>
-                            </p:stCondLst>
-                            <p:childTnLst>
-                              <p:par>
-                                <p:cTn id="27" presetID="1" presetClass="entr" presetSubtype="0" fill="hold" nodeType="clickEffect">
-                                  <p:stCondLst>
-                                    <p:cond delay="0"/>
-                                  </p:stCondLst>
-                                  <p:childTnLst>
-                                    <p:set>
-                                      <p:cBhvr>
-                                        <p:cTn id="28" dur="1" fill="hold">
-                                          <p:stCondLst>
-                                            <p:cond delay="0"/>
-                                          </p:stCondLst>
-                                        </p:cTn>
-                                        <p:tgtEl>
-                                          <p:spTgt spid="8">
+                                          <p:spTgt spid="5">
                                             <p:txEl>
                                               <p:pRg st="8" end="8"/>
-                                            </p:txEl>
-                                          </p:spTgt>
-                                        </p:tgtEl>
-                                        <p:attrNameLst>
-                                          <p:attrName>style.visibility</p:attrName>
-                                        </p:attrNameLst>
-                                      </p:cBhvr>
-                                      <p:to>
-                                        <p:strVal val="visible"/>
-                                      </p:to>
-                                    </p:set>
-                                  </p:childTnLst>
-                                </p:cTn>
-                              </p:par>
-                              <p:par>
-                                <p:cTn id="29" presetID="1" presetClass="entr" presetSubtype="0" fill="hold" nodeType="withEffect">
-                                  <p:stCondLst>
-                                    <p:cond delay="0"/>
-                                  </p:stCondLst>
-                                  <p:childTnLst>
-                                    <p:set>
-                                      <p:cBhvr>
-                                        <p:cTn id="30" dur="1" fill="hold">
-                                          <p:stCondLst>
-                                            <p:cond delay="0"/>
-                                          </p:stCondLst>
-                                        </p:cTn>
-                                        <p:tgtEl>
-                                          <p:spTgt spid="8">
-                                            <p:txEl>
-                                              <p:pRg st="9" end="9"/>
                                             </p:txEl>
                                           </p:spTgt>
                                         </p:tgtEl>
@@ -5629,16 +5209,288 @@
           <a:chExt cx="0" cy="0"/>
         </a:xfrm>
       </p:grpSpPr>
+      <p:sp>
+        <p:nvSpPr>
+          <p:cNvPr id="5" name="Rechteck 4"/>
+          <p:cNvSpPr/>
+          <p:nvPr/>
+        </p:nvSpPr>
+        <p:spPr>
+          <a:xfrm>
+            <a:off x="0" y="1071552"/>
+            <a:ext cx="9144000" cy="1754326"/>
+          </a:xfrm>
+          <a:prstGeom prst="rect">
+            <a:avLst/>
+          </a:prstGeom>
+        </p:spPr>
+        <p:txBody>
+          <a:bodyPr wrap="square">
+            <a:spAutoFit/>
+          </a:bodyPr>
+          <a:lstStyle/>
+          <a:p>
+            <a:r>
+              <a:rPr lang="de-DE" b="1" spc="-1" dirty="0" smtClean="0">
+                <a:solidFill>
+                  <a:srgbClr val="000000"/>
+                </a:solidFill>
+              </a:rPr>
+              <a:t>Komplementäre:                                                                </a:t>
+            </a:r>
+            <a:r>
+              <a:rPr lang="de-DE" b="1" spc="-1" dirty="0" smtClean="0">
+                <a:solidFill>
+                  <a:srgbClr val="000000"/>
+                </a:solidFill>
+              </a:rPr>
+              <a:t> </a:t>
+            </a:r>
+            <a:r>
+              <a:rPr lang="de-DE" b="1" spc="-1" dirty="0" smtClean="0">
+                <a:solidFill>
+                  <a:srgbClr val="000000"/>
+                </a:solidFill>
+                <a:ea typeface="Droid Sans Fallback"/>
+              </a:rPr>
+              <a:t>Kommanditist</a:t>
+            </a:r>
+            <a:r>
+              <a:rPr lang="de-DE" b="1" spc="-1" dirty="0" smtClean="0">
+                <a:solidFill>
+                  <a:srgbClr val="000000"/>
+                </a:solidFill>
+                <a:ea typeface="Droid Sans Fallback"/>
+              </a:rPr>
+              <a:t>:</a:t>
+            </a:r>
+          </a:p>
+          <a:p>
+            <a:r>
+              <a:rPr lang="de-DE" spc="-1" dirty="0" smtClean="0">
+                <a:solidFill>
+                  <a:srgbClr val="000000"/>
+                </a:solidFill>
+                <a:latin typeface="Arial"/>
+                <a:ea typeface="DejaVu Sans"/>
+              </a:rPr>
+              <a:t>Dirk </a:t>
+            </a:r>
+            <a:r>
+              <a:rPr lang="de-DE" spc="-1" dirty="0" err="1" smtClean="0">
+                <a:solidFill>
+                  <a:srgbClr val="000000"/>
+                </a:solidFill>
+                <a:latin typeface="Arial"/>
+                <a:ea typeface="DejaVu Sans"/>
+              </a:rPr>
+              <a:t>Freyberger</a:t>
+            </a:r>
+            <a:r>
+              <a:rPr lang="de-DE" spc="-1" dirty="0" smtClean="0">
+                <a:solidFill>
+                  <a:srgbClr val="000000"/>
+                </a:solidFill>
+                <a:latin typeface="Arial"/>
+                <a:ea typeface="DejaVu Sans"/>
+              </a:rPr>
+              <a:t>                                                                    </a:t>
+            </a:r>
+            <a:r>
+              <a:rPr lang="de-DE" spc="-1" dirty="0" smtClean="0">
+                <a:solidFill>
+                  <a:srgbClr val="000000"/>
+                </a:solidFill>
+                <a:latin typeface="Arial"/>
+                <a:ea typeface="DejaVu Sans"/>
+              </a:rPr>
+              <a:t> </a:t>
+            </a:r>
+            <a:r>
+              <a:rPr lang="de-DE" spc="-1" dirty="0" smtClean="0">
+                <a:solidFill>
+                  <a:srgbClr val="000000"/>
+                </a:solidFill>
+                <a:latin typeface="Arial"/>
+                <a:ea typeface="DejaVu Sans"/>
+              </a:rPr>
+              <a:t>Reiner </a:t>
+            </a:r>
+            <a:r>
+              <a:rPr lang="de-DE" spc="-1" dirty="0" err="1" smtClean="0">
+                <a:solidFill>
+                  <a:srgbClr val="000000"/>
+                </a:solidFill>
+                <a:latin typeface="Arial"/>
+                <a:ea typeface="DejaVu Sans"/>
+              </a:rPr>
+              <a:t>Freyberger</a:t>
+            </a:r>
+            <a:endParaRPr lang="de-DE" spc="-1" dirty="0">
+              <a:solidFill>
+                <a:srgbClr val="000000"/>
+              </a:solidFill>
+              <a:latin typeface="Arial"/>
+              <a:ea typeface="DejaVu Sans"/>
+            </a:endParaRPr>
+          </a:p>
+          <a:p>
+            <a:r>
+              <a:rPr lang="de-DE" spc="-1" dirty="0" smtClean="0">
+                <a:solidFill>
+                  <a:srgbClr val="000000"/>
+                </a:solidFill>
+                <a:latin typeface="Arial"/>
+                <a:ea typeface="DejaVu Sans"/>
+              </a:rPr>
+              <a:t>Sven </a:t>
+            </a:r>
+            <a:r>
+              <a:rPr lang="de-DE" spc="-1" dirty="0" err="1" smtClean="0">
+                <a:solidFill>
+                  <a:srgbClr val="000000"/>
+                </a:solidFill>
+                <a:latin typeface="Arial"/>
+                <a:ea typeface="DejaVu Sans"/>
+              </a:rPr>
+              <a:t>Freyberger</a:t>
+            </a:r>
+            <a:endParaRPr lang="de-DE" dirty="0" smtClean="0"/>
+          </a:p>
+          <a:p>
+            <a:endParaRPr lang="de-DE" b="1" spc="-1" dirty="0" smtClean="0">
+              <a:solidFill>
+                <a:srgbClr val="000000"/>
+              </a:solidFill>
+            </a:endParaRPr>
+          </a:p>
+          <a:p>
+            <a:r>
+              <a:rPr lang="de-DE" b="1" spc="-1" dirty="0" smtClean="0">
+                <a:solidFill>
+                  <a:srgbClr val="000000"/>
+                </a:solidFill>
+              </a:rPr>
+              <a:t>Umsatz (Beispiel):</a:t>
+            </a:r>
+          </a:p>
+          <a:p>
+            <a:r>
+              <a:rPr lang="de-DE" dirty="0" smtClean="0"/>
+              <a:t>534.250 Euro</a:t>
+            </a:r>
+          </a:p>
+        </p:txBody>
+      </p:sp>
+      <p:sp>
+        <p:nvSpPr>
+          <p:cNvPr id="6" name="Textfeld 5"/>
+          <p:cNvSpPr txBox="1"/>
+          <p:nvPr/>
+        </p:nvSpPr>
+        <p:spPr>
+          <a:xfrm>
+            <a:off x="0" y="2928940"/>
+            <a:ext cx="9144000" cy="2031325"/>
+          </a:xfrm>
+          <a:prstGeom prst="rect">
+            <a:avLst/>
+          </a:prstGeom>
+          <a:noFill/>
+        </p:spPr>
+        <p:txBody>
+          <a:bodyPr wrap="square" rtlCol="0">
+            <a:spAutoFit/>
+          </a:bodyPr>
+          <a:lstStyle/>
+          <a:p>
+            <a:pPr algn="ctr"/>
+            <a:endParaRPr lang="de-DE" b="1" spc="-1" dirty="0" smtClean="0">
+              <a:solidFill>
+                <a:srgbClr val="000000"/>
+              </a:solidFill>
+            </a:endParaRPr>
+          </a:p>
+          <a:p>
+            <a:pPr algn="ctr"/>
+            <a:r>
+              <a:rPr lang="de-DE" b="1" spc="-1" dirty="0" smtClean="0">
+                <a:solidFill>
+                  <a:srgbClr val="000000"/>
+                </a:solidFill>
+              </a:rPr>
+              <a:t>Beispiel bei 534.250 € und 9 % Gewinnverteilung:</a:t>
+            </a:r>
+          </a:p>
+          <a:p>
+            <a:endParaRPr lang="de-DE" dirty="0" smtClean="0"/>
+          </a:p>
+          <a:p>
+            <a:r>
+              <a:rPr lang="de-DE" dirty="0" smtClean="0"/>
+              <a:t>109</a:t>
+            </a:r>
+            <a:r>
+              <a:rPr lang="de-DE" dirty="0" smtClean="0"/>
+              <a:t>.750 </a:t>
+            </a:r>
+            <a:r>
+              <a:rPr lang="de-DE" dirty="0" smtClean="0"/>
+              <a:t>€ </a:t>
+            </a:r>
+            <a:r>
+              <a:rPr lang="de-DE" dirty="0" smtClean="0"/>
+              <a:t>Kapitaleinlage                                                    </a:t>
+            </a:r>
+            <a:r>
+              <a:rPr lang="de-DE" dirty="0" smtClean="0"/>
+              <a:t>80</a:t>
+            </a:r>
+            <a:r>
+              <a:rPr lang="de-DE" dirty="0" smtClean="0"/>
+              <a:t>.500 </a:t>
+            </a:r>
+            <a:r>
+              <a:rPr lang="de-DE" dirty="0" smtClean="0"/>
+              <a:t>€ </a:t>
+            </a:r>
+            <a:r>
+              <a:rPr lang="de-DE" dirty="0" smtClean="0"/>
+              <a:t>Kapitaleinlage</a:t>
+            </a:r>
+          </a:p>
+          <a:p>
+            <a:r>
+              <a:rPr lang="de-DE" dirty="0" smtClean="0"/>
+              <a:t>109.750 € Kapitaleinlage</a:t>
+            </a:r>
+            <a:endParaRPr lang="de-DE" dirty="0" smtClean="0"/>
+          </a:p>
+          <a:p>
+            <a:r>
+              <a:rPr lang="de-DE" dirty="0" smtClean="0"/>
+              <a:t>Gehälter: 35.000 </a:t>
+            </a:r>
+            <a:r>
+              <a:rPr lang="de-DE" dirty="0" smtClean="0"/>
+              <a:t>€                                                               </a:t>
+            </a:r>
+          </a:p>
+          <a:p>
+            <a:endParaRPr lang="de-DE" dirty="0"/>
+          </a:p>
+        </p:txBody>
+      </p:sp>
       <p:pic>
         <p:nvPicPr>
-          <p:cNvPr id="4" name="Picture 2" descr="D:\Schule\BWP\250px-Hoyer_Unternehmensgruppe_Logo.svg.png"/>
+          <p:cNvPr id="7" name="Picture 2" descr="D:\Schule\BWP\metzgerei.png"/>
           <p:cNvPicPr>
             <a:picLocks noChangeAspect="1" noChangeArrowheads="1"/>
           </p:cNvPicPr>
           <p:nvPr/>
         </p:nvPicPr>
         <p:blipFill>
-          <a:blip r:embed="rId2"/>
+          <a:blip r:embed="rId2" cstate="print"/>
           <a:srcRect/>
           <a:stretch>
             <a:fillRect/>
@@ -5646,8 +5498,8 @@
         </p:blipFill>
         <p:spPr bwMode="auto">
           <a:xfrm>
-            <a:off x="3500430" y="142858"/>
-            <a:ext cx="2286016" cy="896118"/>
+            <a:off x="7429520" y="142858"/>
+            <a:ext cx="1596986" cy="957981"/>
           </a:xfrm>
           <a:prstGeom prst="rect">
             <a:avLst/>
@@ -5655,221 +5507,6 @@
           <a:noFill/>
         </p:spPr>
       </p:pic>
-      <p:sp>
-        <p:nvSpPr>
-          <p:cNvPr id="5" name="Rechteck 4"/>
-          <p:cNvSpPr/>
-          <p:nvPr/>
-        </p:nvSpPr>
-        <p:spPr>
-          <a:xfrm>
-            <a:off x="0" y="1142991"/>
-            <a:ext cx="9144000" cy="2031325"/>
-          </a:xfrm>
-          <a:prstGeom prst="rect">
-            <a:avLst/>
-          </a:prstGeom>
-        </p:spPr>
-        <p:txBody>
-          <a:bodyPr wrap="square">
-            <a:spAutoFit/>
-          </a:bodyPr>
-          <a:lstStyle/>
-          <a:p>
-            <a:r>
-              <a:rPr lang="de-DE" b="1" spc="-1" dirty="0" smtClean="0">
-                <a:solidFill>
-                  <a:srgbClr val="000000"/>
-                </a:solidFill>
-              </a:rPr>
-              <a:t>Komplementär:                                                                </a:t>
-            </a:r>
-            <a:r>
-              <a:rPr lang="de-DE" b="1" spc="-1" dirty="0" smtClean="0">
-                <a:solidFill>
-                  <a:srgbClr val="000000"/>
-                </a:solidFill>
-                <a:ea typeface="Droid Sans Fallback"/>
-              </a:rPr>
-              <a:t>Kommanditisten:</a:t>
-            </a:r>
-          </a:p>
-          <a:p>
-            <a:r>
-              <a:rPr lang="de-DE" spc="-1" dirty="0">
-                <a:solidFill>
-                  <a:srgbClr val="000000"/>
-                </a:solidFill>
-                <a:latin typeface="Arial"/>
-                <a:ea typeface="DejaVu Sans"/>
-              </a:rPr>
-              <a:t>Heinz-Wilhelm </a:t>
-            </a:r>
-            <a:r>
-              <a:rPr lang="de-DE" spc="-1" dirty="0" smtClean="0">
-                <a:solidFill>
-                  <a:srgbClr val="000000"/>
-                </a:solidFill>
-                <a:latin typeface="Arial"/>
-                <a:ea typeface="DejaVu Sans"/>
-              </a:rPr>
-              <a:t>Hoyer                                                         </a:t>
-            </a:r>
-            <a:r>
-              <a:rPr lang="de-DE" dirty="0" smtClean="0"/>
-              <a:t>Thomas Hoyer</a:t>
-            </a:r>
-            <a:endParaRPr lang="de-DE" spc="-1" dirty="0">
-              <a:solidFill>
-                <a:srgbClr val="000000"/>
-              </a:solidFill>
-              <a:latin typeface="Arial"/>
-              <a:ea typeface="DejaVu Sans"/>
-            </a:endParaRPr>
-          </a:p>
-          <a:p>
-            <a:r>
-              <a:rPr lang="de-DE" b="1" spc="-1" dirty="0" smtClean="0">
-                <a:solidFill>
-                  <a:srgbClr val="000000"/>
-                </a:solidFill>
-              </a:rPr>
-              <a:t>                                                                                           </a:t>
-            </a:r>
-            <a:r>
-              <a:rPr lang="de-DE" dirty="0" smtClean="0"/>
-              <a:t>Markus Hoyer</a:t>
-            </a:r>
-          </a:p>
-          <a:p>
-            <a:r>
-              <a:rPr lang="de-DE" b="1" spc="-1" dirty="0" smtClean="0">
-                <a:solidFill>
-                  <a:srgbClr val="000000"/>
-                </a:solidFill>
-              </a:rPr>
-              <a:t>Umsatz 2018:</a:t>
-            </a:r>
-          </a:p>
-          <a:p>
-            <a:r>
-              <a:rPr lang="de-DE" dirty="0" smtClean="0"/>
-              <a:t>1.166.869</a:t>
-            </a:r>
-            <a:r>
-              <a:rPr lang="de-DE" dirty="0" smtClean="0"/>
-              <a:t> Euro</a:t>
-            </a:r>
-            <a:endParaRPr lang="de-DE" dirty="0" smtClean="0"/>
-          </a:p>
-          <a:p>
-            <a:endParaRPr lang="de-DE" b="1" spc="-1" dirty="0">
-              <a:solidFill>
-                <a:srgbClr val="000000"/>
-              </a:solidFill>
-            </a:endParaRPr>
-          </a:p>
-          <a:p>
-            <a:endParaRPr lang="de-DE" dirty="0"/>
-          </a:p>
-        </p:txBody>
-      </p:sp>
-      <p:sp>
-        <p:nvSpPr>
-          <p:cNvPr id="6" name="Textfeld 5"/>
-          <p:cNvSpPr txBox="1"/>
-          <p:nvPr/>
-        </p:nvSpPr>
-        <p:spPr>
-          <a:xfrm>
-            <a:off x="0" y="3000378"/>
-            <a:ext cx="9144000" cy="1477328"/>
-          </a:xfrm>
-          <a:prstGeom prst="rect">
-            <a:avLst/>
-          </a:prstGeom>
-          <a:noFill/>
-        </p:spPr>
-        <p:txBody>
-          <a:bodyPr wrap="square" rtlCol="0">
-            <a:spAutoFit/>
-          </a:bodyPr>
-          <a:lstStyle/>
-          <a:p>
-            <a:pPr algn="ctr"/>
-            <a:r>
-              <a:rPr lang="de-DE" b="1" spc="-1" dirty="0" smtClean="0">
-                <a:solidFill>
-                  <a:srgbClr val="000000"/>
-                </a:solidFill>
-              </a:rPr>
-              <a:t>Beispiel bei </a:t>
-            </a:r>
-            <a:r>
-              <a:rPr lang="de-DE" b="1" spc="-1" dirty="0" smtClean="0">
-                <a:solidFill>
-                  <a:srgbClr val="000000"/>
-                </a:solidFill>
-              </a:rPr>
-              <a:t>355.360 € und 7,6 </a:t>
-            </a:r>
-            <a:r>
-              <a:rPr lang="de-DE" b="1" spc="-1" dirty="0" smtClean="0">
-                <a:solidFill>
-                  <a:srgbClr val="000000"/>
-                </a:solidFill>
-              </a:rPr>
-              <a:t>% Gewinnverteilung:</a:t>
-            </a:r>
-          </a:p>
-          <a:p>
-            <a:endParaRPr lang="de-DE" dirty="0" smtClean="0"/>
-          </a:p>
-          <a:p>
-            <a:r>
-              <a:rPr lang="de-DE" dirty="0" smtClean="0"/>
-              <a:t>2</a:t>
-            </a:r>
-            <a:r>
-              <a:rPr lang="de-DE" dirty="0" smtClean="0"/>
-              <a:t>00.000 </a:t>
-            </a:r>
-            <a:r>
-              <a:rPr lang="de-DE" dirty="0" smtClean="0"/>
-              <a:t>€ Kapitaleinlage                                                  </a:t>
-            </a:r>
-            <a:r>
-              <a:rPr lang="de-DE" dirty="0" smtClean="0"/>
-              <a:t>77</a:t>
-            </a:r>
-            <a:r>
-              <a:rPr lang="de-DE" dirty="0" smtClean="0"/>
-              <a:t>.680 </a:t>
-            </a:r>
-            <a:r>
-              <a:rPr lang="de-DE" dirty="0" smtClean="0"/>
-              <a:t>€ Kapitaleinlage</a:t>
-            </a:r>
-          </a:p>
-          <a:p>
-            <a:r>
-              <a:rPr lang="de-DE" dirty="0" smtClean="0"/>
-              <a:t>Gehalt: 50.000 €                                                               </a:t>
-            </a:r>
-            <a:r>
-              <a:rPr lang="de-DE" dirty="0" smtClean="0"/>
-              <a:t>77.680 </a:t>
-            </a:r>
-            <a:r>
-              <a:rPr lang="de-DE" dirty="0" smtClean="0"/>
-              <a:t>€ Kapitaleinlage</a:t>
-            </a:r>
-          </a:p>
-          <a:p>
-            <a:endParaRPr lang="de-DE" dirty="0"/>
-          </a:p>
-        </p:txBody>
-      </p:sp>
     </p:spTree>
   </p:cSld>
   <p:clrMapOvr>
@@ -6021,14 +5658,14 @@
       </p:grpSpPr>
       <p:pic>
         <p:nvPicPr>
-          <p:cNvPr id="4" name="Picture 2" descr="D:\Schule\BWP\250px-Hoyer_Unternehmensgruppe_Logo.svg.png"/>
+          <p:cNvPr id="7" name="Picture 2" descr="D:\Schule\BWP\metzgerei.png"/>
           <p:cNvPicPr>
             <a:picLocks noChangeAspect="1" noChangeArrowheads="1"/>
           </p:cNvPicPr>
           <p:nvPr/>
         </p:nvPicPr>
         <p:blipFill>
-          <a:blip r:embed="rId2"/>
+          <a:blip r:embed="rId2" cstate="print"/>
           <a:srcRect/>
           <a:stretch>
             <a:fillRect/>
@@ -6036,8 +5673,8 @@
         </p:blipFill>
         <p:spPr bwMode="auto">
           <a:xfrm>
-            <a:off x="3500430" y="142858"/>
-            <a:ext cx="2286016" cy="896118"/>
+            <a:off x="7429520" y="142858"/>
+            <a:ext cx="1596986" cy="957981"/>
           </a:xfrm>
           <a:prstGeom prst="rect">
             <a:avLst/>
@@ -6047,13 +5684,13 @@
       </p:pic>
       <p:sp>
         <p:nvSpPr>
-          <p:cNvPr id="3" name="CustomShape 7"/>
+          <p:cNvPr id="8" name="CustomShape 7"/>
           <p:cNvSpPr/>
           <p:nvPr/>
         </p:nvSpPr>
         <p:spPr>
           <a:xfrm>
-            <a:off x="822960" y="1188720"/>
+            <a:off x="822960" y="1071552"/>
             <a:ext cx="7130520" cy="2702880"/>
           </a:xfrm>
           <a:prstGeom prst="rect">
@@ -6131,6 +5768,16 @@
               <a:t>KT: </a:t>
             </a:r>
             <a:r>
+              <a:rPr lang="de-DE" sz="2000" spc="-1" dirty="0" smtClean="0">
+                <a:solidFill>
+                  <a:srgbClr val="000000"/>
+                </a:solidFill>
+                <a:latin typeface="Arial"/>
+                <a:ea typeface="DejaVu Sans"/>
+              </a:rPr>
+              <a:t>9</a:t>
+            </a:r>
+            <a:r>
               <a:rPr lang="de-DE" sz="2000" b="0" strike="noStrike" spc="-1" dirty="0" smtClean="0">
                 <a:solidFill>
                   <a:srgbClr val="000000"/>
@@ -6138,7 +5785,7 @@
                 <a:latin typeface="Arial"/>
                 <a:ea typeface="DejaVu Sans"/>
               </a:rPr>
-              <a:t>7,6 </a:t>
+              <a:t> </a:t>
             </a:r>
             <a:r>
               <a:rPr lang="de-DE" sz="2000" b="0" strike="noStrike" spc="-1" dirty="0">
@@ -6151,6 +5798,16 @@
               <a:t>% von </a:t>
             </a:r>
             <a:r>
+              <a:rPr lang="de-DE" sz="2000" spc="-1" dirty="0" smtClean="0">
+                <a:solidFill>
+                  <a:srgbClr val="000000"/>
+                </a:solidFill>
+                <a:latin typeface="Arial"/>
+                <a:ea typeface="DejaVu Sans"/>
+              </a:rPr>
+              <a:t>109</a:t>
+            </a:r>
+            <a:r>
               <a:rPr lang="de-DE" sz="2000" b="0" strike="noStrike" spc="-1" dirty="0" smtClean="0">
                 <a:solidFill>
                   <a:srgbClr val="000000"/>
@@ -6158,7 +5815,7 @@
                 <a:latin typeface="Arial"/>
                 <a:ea typeface="DejaVu Sans"/>
               </a:rPr>
-              <a:t>200.000 </a:t>
+              <a:t>.750 </a:t>
             </a:r>
             <a:r>
               <a:rPr lang="de-DE" sz="2000" b="0" strike="noStrike" spc="-1" dirty="0">
@@ -6171,6 +5828,16 @@
               <a:t>€ = </a:t>
             </a:r>
             <a:r>
+              <a:rPr lang="de-DE" sz="2000" spc="-1" dirty="0" smtClean="0">
+                <a:solidFill>
+                  <a:srgbClr val="000000"/>
+                </a:solidFill>
+                <a:latin typeface="Arial"/>
+                <a:ea typeface="DejaVu Sans"/>
+              </a:rPr>
+              <a:t>9</a:t>
+            </a:r>
+            <a:r>
               <a:rPr lang="de-DE" sz="2000" b="0" strike="noStrike" spc="-1" dirty="0" smtClean="0">
                 <a:solidFill>
                   <a:srgbClr val="000000"/>
@@ -6178,7 +5845,7 @@
                 <a:latin typeface="Arial"/>
                 <a:ea typeface="DejaVu Sans"/>
               </a:rPr>
-              <a:t>15.200 </a:t>
+              <a:t>.877,50 </a:t>
             </a:r>
             <a:r>
               <a:rPr lang="de-DE" sz="2000" b="0" strike="noStrike" spc="-1" dirty="0">
@@ -6214,6 +5881,16 @@
               <a:t>KD: </a:t>
             </a:r>
             <a:r>
+              <a:rPr lang="de-DE" sz="2000" spc="-1" dirty="0" smtClean="0">
+                <a:solidFill>
+                  <a:srgbClr val="000000"/>
+                </a:solidFill>
+                <a:latin typeface="Arial"/>
+                <a:ea typeface="DejaVu Sans"/>
+              </a:rPr>
+              <a:t>9</a:t>
+            </a:r>
+            <a:r>
               <a:rPr lang="de-DE" sz="2000" b="0" strike="noStrike" spc="-1" dirty="0" smtClean="0">
                 <a:solidFill>
                   <a:srgbClr val="000000"/>
@@ -6221,7 +5898,7 @@
                 <a:latin typeface="Arial"/>
                 <a:ea typeface="DejaVu Sans"/>
               </a:rPr>
-              <a:t>7,6 </a:t>
+              <a:t> </a:t>
             </a:r>
             <a:r>
               <a:rPr lang="de-DE" sz="2000" b="0" strike="noStrike" spc="-1" dirty="0">
@@ -6244,16 +5921,6 @@
               <a:t> </a:t>
             </a:r>
             <a:r>
-              <a:rPr lang="de-DE" sz="2000" spc="-1" dirty="0" smtClean="0">
-                <a:solidFill>
-                  <a:srgbClr val="000000"/>
-                </a:solidFill>
-                <a:latin typeface="Arial"/>
-                <a:ea typeface="DejaVu Sans"/>
-              </a:rPr>
-              <a:t>77</a:t>
-            </a:r>
-            <a:r>
               <a:rPr lang="de-DE" sz="2000" b="0" strike="noStrike" spc="-1" dirty="0" smtClean="0">
                 <a:solidFill>
                   <a:srgbClr val="000000"/>
@@ -6261,7 +5928,17 @@
                 <a:latin typeface="Arial"/>
                 <a:ea typeface="DejaVu Sans"/>
               </a:rPr>
-              <a:t>.680 </a:t>
+              <a:t>80</a:t>
+            </a:r>
+            <a:r>
+              <a:rPr lang="de-DE" sz="2000" b="0" strike="noStrike" spc="-1" dirty="0" smtClean="0">
+                <a:solidFill>
+                  <a:srgbClr val="000000"/>
+                </a:solidFill>
+                <a:latin typeface="Arial"/>
+                <a:ea typeface="DejaVu Sans"/>
+              </a:rPr>
+              <a:t>.500 </a:t>
             </a:r>
             <a:r>
               <a:rPr lang="de-DE" sz="2000" b="0" strike="noStrike" spc="-1" dirty="0">
@@ -6271,7 +5948,7 @@
                 <a:latin typeface="Arial"/>
                 <a:ea typeface="DejaVu Sans"/>
               </a:rPr>
-              <a:t>€ = </a:t>
+              <a:t>€ </a:t>
             </a:r>
             <a:r>
               <a:rPr lang="de-DE" sz="2000" b="0" strike="noStrike" spc="-1" dirty="0" smtClean="0">
@@ -6281,7 +5958,7 @@
                 <a:latin typeface="Arial"/>
                 <a:ea typeface="DejaVu Sans"/>
               </a:rPr>
-              <a:t>  5.903,68 </a:t>
+              <a:t>= 7.245 </a:t>
             </a:r>
             <a:r>
               <a:rPr lang="de-DE" sz="2000" b="0" strike="noStrike" spc="-1" dirty="0">
@@ -6324,6 +6001,66 @@
               <a:t>        </a:t>
             </a:r>
             <a:r>
+              <a:rPr lang="de-DE" sz="2000" b="0" strike="noStrike" spc="-1" dirty="0" smtClean="0">
+                <a:solidFill>
+                  <a:srgbClr val="000000"/>
+                </a:solidFill>
+                <a:latin typeface="Arial"/>
+                <a:ea typeface="DejaVu Sans"/>
+              </a:rPr>
+              <a:t>534.250</a:t>
+            </a:r>
+            <a:r>
+              <a:rPr lang="de-DE" sz="2000" b="0" strike="noStrike" spc="-1" dirty="0" smtClean="0">
+                <a:solidFill>
+                  <a:srgbClr val="000000"/>
+                </a:solidFill>
+                <a:latin typeface="Arial"/>
+                <a:ea typeface="DejaVu Sans"/>
+              </a:rPr>
+              <a:t> </a:t>
+            </a:r>
+            <a:r>
+              <a:rPr lang="de-DE" sz="2000" b="0" strike="noStrike" spc="-1" dirty="0">
+                <a:solidFill>
+                  <a:srgbClr val="000000"/>
+                </a:solidFill>
+                <a:latin typeface="Arial"/>
+                <a:ea typeface="DejaVu Sans"/>
+              </a:rPr>
+              <a:t>€ - </a:t>
+            </a:r>
+            <a:r>
+              <a:rPr lang="de-DE" sz="2000" b="0" strike="noStrike" spc="-1" dirty="0" smtClean="0">
+                <a:solidFill>
+                  <a:srgbClr val="000000"/>
+                </a:solidFill>
+                <a:latin typeface="Arial"/>
+                <a:ea typeface="DejaVu Sans"/>
+              </a:rPr>
+              <a:t>9</a:t>
+            </a:r>
+            <a:r>
+              <a:rPr lang="de-DE" sz="2000" b="0" strike="noStrike" spc="-1" dirty="0" smtClean="0">
+                <a:solidFill>
+                  <a:srgbClr val="000000"/>
+                </a:solidFill>
+                <a:latin typeface="Arial"/>
+                <a:ea typeface="DejaVu Sans"/>
+              </a:rPr>
+              <a:t>.877,50 </a:t>
+            </a:r>
+            <a:r>
+              <a:rPr lang="de-DE" sz="2000" b="0" strike="noStrike" spc="-1" dirty="0">
+                <a:solidFill>
+                  <a:srgbClr val="000000"/>
+                </a:solidFill>
+                <a:latin typeface="Arial"/>
+                <a:ea typeface="DejaVu Sans"/>
+              </a:rPr>
+              <a:t>€ - </a:t>
+            </a:r>
+            <a:r>
               <a:rPr lang="de-DE" sz="2000" spc="-1" dirty="0" smtClean="0">
                 <a:solidFill>
                   <a:srgbClr val="000000"/>
@@ -6331,7 +6068,7 @@
                 <a:latin typeface="Arial"/>
                 <a:ea typeface="DejaVu Sans"/>
               </a:rPr>
-              <a:t>35</a:t>
+              <a:t>7.245</a:t>
             </a:r>
             <a:r>
               <a:rPr lang="de-DE" sz="2000" b="0" strike="noStrike" spc="-1" dirty="0" smtClean="0">
@@ -6341,7 +6078,7 @@
                 <a:latin typeface="Arial"/>
                 <a:ea typeface="DejaVu Sans"/>
               </a:rPr>
-              <a:t>5.360 </a:t>
+              <a:t> </a:t>
             </a:r>
             <a:r>
               <a:rPr lang="de-DE" sz="2000" b="0" strike="noStrike" spc="-1" dirty="0">
@@ -6351,7 +6088,7 @@
                 <a:latin typeface="Arial"/>
                 <a:ea typeface="DejaVu Sans"/>
               </a:rPr>
-              <a:t>€ - </a:t>
+              <a:t>€ = </a:t>
             </a:r>
             <a:r>
               <a:rPr lang="de-DE" sz="2000" spc="-1" dirty="0" smtClean="0">
@@ -6361,7 +6098,7 @@
                 <a:latin typeface="Arial"/>
                 <a:ea typeface="DejaVu Sans"/>
               </a:rPr>
-              <a:t>15</a:t>
+              <a:t>517</a:t>
             </a:r>
             <a:r>
               <a:rPr lang="de-DE" sz="2000" b="0" strike="noStrike" spc="-1" dirty="0" smtClean="0">
@@ -6371,57 +6108,7 @@
                 <a:latin typeface="Arial"/>
                 <a:ea typeface="DejaVu Sans"/>
               </a:rPr>
-              <a:t>.200 </a:t>
-            </a:r>
-            <a:r>
-              <a:rPr lang="de-DE" sz="2000" b="0" strike="noStrike" spc="-1" dirty="0">
-                <a:solidFill>
-                  <a:srgbClr val="000000"/>
-                </a:solidFill>
-                <a:latin typeface="Arial"/>
-                <a:ea typeface="DejaVu Sans"/>
-              </a:rPr>
-              <a:t>€ - </a:t>
-            </a:r>
-            <a:r>
-              <a:rPr lang="de-DE" sz="2000" b="0" strike="noStrike" spc="-1" dirty="0" smtClean="0">
-                <a:solidFill>
-                  <a:srgbClr val="000000"/>
-                </a:solidFill>
-                <a:latin typeface="Arial"/>
-                <a:ea typeface="DejaVu Sans"/>
-              </a:rPr>
-              <a:t>11.807,36 </a:t>
-            </a:r>
-            <a:r>
-              <a:rPr lang="de-DE" sz="2000" b="0" strike="noStrike" spc="-1" dirty="0">
-                <a:solidFill>
-                  <a:srgbClr val="000000"/>
-                </a:solidFill>
-                <a:latin typeface="Arial"/>
-                <a:ea typeface="DejaVu Sans"/>
-              </a:rPr>
-              <a:t>€ = </a:t>
-            </a:r>
-            <a:r>
-              <a:rPr lang="de-DE" sz="2000" b="0" strike="noStrike" spc="-1" dirty="0" smtClean="0">
-                <a:solidFill>
-                  <a:srgbClr val="000000"/>
-                </a:solidFill>
-                <a:latin typeface="Arial"/>
-                <a:ea typeface="DejaVu Sans"/>
-              </a:rPr>
-              <a:t>328.352,64</a:t>
-            </a:r>
-            <a:r>
-              <a:rPr lang="de-DE" sz="2000" b="0" strike="noStrike" spc="-1" dirty="0" smtClean="0">
-                <a:solidFill>
-                  <a:srgbClr val="000000"/>
-                </a:solidFill>
-                <a:latin typeface="Arial"/>
-                <a:ea typeface="DejaVu Sans"/>
-              </a:rPr>
-              <a:t> </a:t>
+              <a:t>.127,50 </a:t>
             </a:r>
             <a:r>
               <a:rPr lang="de-DE" sz="2000" b="0" strike="noStrike" spc="-1" dirty="0">
@@ -6484,6 +6171,16 @@
               </a:lnSpc>
             </a:pPr>
             <a:r>
+              <a:rPr lang="de-DE" sz="2000" spc="-1" dirty="0" smtClean="0">
+                <a:solidFill>
+                  <a:srgbClr val="000000"/>
+                </a:solidFill>
+                <a:latin typeface="Arial"/>
+                <a:ea typeface="DejaVu Sans"/>
+              </a:rPr>
+              <a:t>517</a:t>
+            </a:r>
+            <a:r>
               <a:rPr lang="de-DE" sz="2000" b="0" strike="noStrike" spc="-1" dirty="0" smtClean="0">
                 <a:solidFill>
                   <a:srgbClr val="000000"/>
@@ -6491,7 +6188,17 @@
                 <a:latin typeface="Arial"/>
                 <a:ea typeface="DejaVu Sans"/>
               </a:rPr>
-              <a:t>328</a:t>
+              <a:t>.127,50 </a:t>
+            </a:r>
+            <a:r>
+              <a:rPr lang="de-DE" sz="2000" b="0" strike="noStrike" spc="-1" dirty="0">
+                <a:solidFill>
+                  <a:srgbClr val="000000"/>
+                </a:solidFill>
+                <a:latin typeface="Arial"/>
+                <a:ea typeface="DejaVu Sans"/>
+              </a:rPr>
+              <a:t>€ - </a:t>
             </a:r>
             <a:r>
               <a:rPr lang="de-DE" sz="2000" b="0" strike="noStrike" spc="-1" dirty="0" smtClean="0">
@@ -6501,7 +6208,17 @@
                 <a:latin typeface="Arial"/>
                 <a:ea typeface="DejaVu Sans"/>
               </a:rPr>
-              <a:t>.352,64 </a:t>
+              <a:t>70</a:t>
+            </a:r>
+            <a:r>
+              <a:rPr lang="de-DE" sz="2000" b="0" strike="noStrike" spc="-1" dirty="0" smtClean="0">
+                <a:solidFill>
+                  <a:srgbClr val="000000"/>
+                </a:solidFill>
+                <a:latin typeface="Arial"/>
+                <a:ea typeface="DejaVu Sans"/>
+              </a:rPr>
+              <a:t>.000 </a:t>
             </a:r>
             <a:r>
               <a:rPr lang="de-DE" sz="2000" b="0" strike="noStrike" spc="-1" dirty="0">
@@ -6511,17 +6228,7 @@
                 <a:latin typeface="Arial"/>
                 <a:ea typeface="DejaVu Sans"/>
               </a:rPr>
-              <a:t>€ - </a:t>
-            </a:r>
-            <a:r>
-              <a:rPr lang="de-DE" sz="2000" spc="-1" dirty="0" smtClean="0">
-                <a:solidFill>
-                  <a:srgbClr val="000000"/>
-                </a:solidFill>
-                <a:latin typeface="Arial"/>
-                <a:ea typeface="DejaVu Sans"/>
-              </a:rPr>
-              <a:t>50</a:t>
+              <a:t>€ = </a:t>
             </a:r>
             <a:r>
               <a:rPr lang="de-DE" sz="2000" b="0" strike="noStrike" spc="-1" dirty="0" smtClean="0">
@@ -6531,27 +6238,7 @@
                 <a:latin typeface="Arial"/>
                 <a:ea typeface="DejaVu Sans"/>
               </a:rPr>
-              <a:t>.000 </a:t>
-            </a:r>
-            <a:r>
-              <a:rPr lang="de-DE" sz="2000" b="0" strike="noStrike" spc="-1" dirty="0">
-                <a:solidFill>
-                  <a:srgbClr val="000000"/>
-                </a:solidFill>
-                <a:latin typeface="Arial"/>
-                <a:ea typeface="DejaVu Sans"/>
-              </a:rPr>
-              <a:t>€ = </a:t>
-            </a:r>
-            <a:r>
-              <a:rPr lang="de-DE" sz="2000" spc="-1" dirty="0" smtClean="0">
-                <a:solidFill>
-                  <a:srgbClr val="000000"/>
-                </a:solidFill>
-                <a:latin typeface="Arial"/>
-                <a:ea typeface="DejaVu Sans"/>
-              </a:rPr>
-              <a:t>278</a:t>
+              <a:t>447</a:t>
             </a:r>
             <a:r>
               <a:rPr lang="de-DE" sz="2000" b="0" strike="noStrike" spc="-1" dirty="0" smtClean="0">
@@ -6561,7 +6248,7 @@
                 <a:latin typeface="Arial"/>
                 <a:ea typeface="DejaVu Sans"/>
               </a:rPr>
-              <a:t>.352,64 </a:t>
+              <a:t>.127,50 </a:t>
             </a:r>
             <a:r>
               <a:rPr lang="de-DE" sz="2000" b="0" strike="noStrike" spc="-1" dirty="0">
@@ -6618,7 +6305,7 @@
                                           </p:stCondLst>
                                         </p:cTn>
                                         <p:tgtEl>
-                                          <p:spTgt spid="3">
+                                          <p:spTgt spid="8">
                                             <p:txEl>
                                               <p:pRg st="0" end="0"/>
                                             </p:txEl>
@@ -6649,7 +6336,7 @@
                                           </p:stCondLst>
                                         </p:cTn>
                                         <p:tgtEl>
-                                          <p:spTgt spid="3">
+                                          <p:spTgt spid="8">
                                             <p:txEl>
                                               <p:pRg st="2" end="2"/>
                                             </p:txEl>
@@ -6680,7 +6367,7 @@
                                           </p:stCondLst>
                                         </p:cTn>
                                         <p:tgtEl>
-                                          <p:spTgt spid="3">
+                                          <p:spTgt spid="8">
                                             <p:txEl>
                                               <p:pRg st="3" end="3"/>
                                             </p:txEl>
@@ -6729,7 +6416,7 @@
                                           </p:stCondLst>
                                         </p:cTn>
                                         <p:tgtEl>
-                                          <p:spTgt spid="3">
+                                          <p:spTgt spid="8">
                                             <p:txEl>
                                               <p:pRg st="5" end="5"/>
                                             </p:txEl>
@@ -6778,7 +6465,7 @@
                                           </p:stCondLst>
                                         </p:cTn>
                                         <p:tgtEl>
-                                          <p:spTgt spid="3">
+                                          <p:spTgt spid="8">
                                             <p:txEl>
                                               <p:pRg st="7" end="7"/>
                                             </p:txEl>
@@ -6809,7 +6496,7 @@
                                           </p:stCondLst>
                                         </p:cTn>
                                         <p:tgtEl>
-                                          <p:spTgt spid="3">
+                                          <p:spTgt spid="8">
                                             <p:txEl>
                                               <p:pRg st="9" end="9"/>
                                             </p:txEl>
@@ -6876,14 +6563,14 @@
       </p:grpSpPr>
       <p:pic>
         <p:nvPicPr>
-          <p:cNvPr id="4" name="Picture 2" descr="D:\Schule\BWP\250px-Hoyer_Unternehmensgruppe_Logo.svg.png"/>
+          <p:cNvPr id="7" name="Picture 2" descr="D:\Schule\BWP\metzgerei.png"/>
           <p:cNvPicPr>
             <a:picLocks noChangeAspect="1" noChangeArrowheads="1"/>
           </p:cNvPicPr>
           <p:nvPr/>
         </p:nvPicPr>
         <p:blipFill>
-          <a:blip r:embed="rId2"/>
+          <a:blip r:embed="rId2" cstate="print"/>
           <a:srcRect/>
           <a:stretch>
             <a:fillRect/>
@@ -6891,8 +6578,8 @@
         </p:blipFill>
         <p:spPr bwMode="auto">
           <a:xfrm>
-            <a:off x="3500430" y="142858"/>
-            <a:ext cx="2286016" cy="896118"/>
+            <a:off x="7429520" y="142858"/>
+            <a:ext cx="1596986" cy="957981"/>
           </a:xfrm>
           <a:prstGeom prst="rect">
             <a:avLst/>
@@ -6902,13 +6589,13 @@
       </p:pic>
       <p:sp>
         <p:nvSpPr>
-          <p:cNvPr id="3" name="CustomShape 7"/>
+          <p:cNvPr id="6" name="CustomShape 7"/>
           <p:cNvSpPr/>
           <p:nvPr/>
         </p:nvSpPr>
         <p:spPr>
           <a:xfrm>
-            <a:off x="214282" y="1214428"/>
+            <a:off x="214282" y="1066598"/>
             <a:ext cx="8929718" cy="2648160"/>
           </a:xfrm>
           <a:prstGeom prst="rect">
@@ -6986,6 +6673,56 @@
               <a:t>KT: </a:t>
             </a:r>
             <a:r>
+              <a:rPr lang="de-DE" sz="2000" b="0" strike="noStrike" spc="-1" dirty="0" smtClean="0">
+                <a:solidFill>
+                  <a:srgbClr val="000000"/>
+                </a:solidFill>
+                <a:latin typeface="Arial"/>
+                <a:ea typeface="DejaVu Sans"/>
+              </a:rPr>
+              <a:t>447</a:t>
+            </a:r>
+            <a:r>
+              <a:rPr lang="de-DE" sz="2000" b="0" strike="noStrike" spc="-1" dirty="0" smtClean="0">
+                <a:solidFill>
+                  <a:srgbClr val="000000"/>
+                </a:solidFill>
+                <a:latin typeface="Arial"/>
+                <a:ea typeface="DejaVu Sans"/>
+              </a:rPr>
+              <a:t>.127,50 </a:t>
+            </a:r>
+            <a:r>
+              <a:rPr lang="de-DE" sz="2000" b="0" strike="noStrike" spc="-1" dirty="0">
+                <a:solidFill>
+                  <a:srgbClr val="000000"/>
+                </a:solidFill>
+                <a:latin typeface="Arial"/>
+                <a:ea typeface="DejaVu Sans"/>
+              </a:rPr>
+              <a:t>€ * </a:t>
+            </a:r>
+            <a:r>
+              <a:rPr lang="de-DE" sz="2000" b="0" strike="noStrike" spc="-1" dirty="0" smtClean="0">
+                <a:solidFill>
+                  <a:srgbClr val="000000"/>
+                </a:solidFill>
+                <a:latin typeface="Arial"/>
+                <a:ea typeface="DejaVu Sans"/>
+              </a:rPr>
+              <a:t>0,36 </a:t>
+            </a:r>
+            <a:r>
+              <a:rPr lang="de-DE" sz="2000" b="0" strike="noStrike" spc="-1" dirty="0">
+                <a:solidFill>
+                  <a:srgbClr val="000000"/>
+                </a:solidFill>
+                <a:latin typeface="Arial"/>
+                <a:ea typeface="DejaVu Sans"/>
+              </a:rPr>
+              <a:t>= </a:t>
+            </a:r>
+            <a:r>
               <a:rPr lang="de-DE" sz="2000" spc="-1" dirty="0" smtClean="0">
                 <a:solidFill>
                   <a:srgbClr val="000000"/>
@@ -6993,7 +6730,7 @@
                 <a:latin typeface="Arial"/>
                 <a:ea typeface="DejaVu Sans"/>
               </a:rPr>
-              <a:t>278</a:t>
+              <a:t>160</a:t>
             </a:r>
             <a:r>
               <a:rPr lang="de-DE" sz="2000" b="0" strike="noStrike" spc="-1" dirty="0" smtClean="0">
@@ -7003,67 +6740,7 @@
                 <a:latin typeface="Arial"/>
                 <a:ea typeface="DejaVu Sans"/>
               </a:rPr>
-              <a:t>.352,64 </a:t>
-            </a:r>
-            <a:r>
-              <a:rPr lang="de-DE" sz="2000" b="0" strike="noStrike" spc="-1" dirty="0">
-                <a:solidFill>
-                  <a:srgbClr val="000000"/>
-                </a:solidFill>
-                <a:latin typeface="Arial"/>
-                <a:ea typeface="DejaVu Sans"/>
-              </a:rPr>
-              <a:t>€ * </a:t>
-            </a:r>
-            <a:r>
-              <a:rPr lang="de-DE" sz="2000" b="0" strike="noStrike" spc="-1" dirty="0" smtClean="0">
-                <a:solidFill>
-                  <a:srgbClr val="000000"/>
-                </a:solidFill>
-                <a:latin typeface="Arial"/>
-                <a:ea typeface="DejaVu Sans"/>
-              </a:rPr>
-              <a:t>0,2 </a:t>
-            </a:r>
-            <a:r>
-              <a:rPr lang="de-DE" sz="2000" b="0" strike="noStrike" spc="-1" dirty="0">
-                <a:solidFill>
-                  <a:srgbClr val="000000"/>
-                </a:solidFill>
-                <a:latin typeface="Arial"/>
-                <a:ea typeface="DejaVu Sans"/>
-              </a:rPr>
-              <a:t>= </a:t>
-            </a:r>
-            <a:r>
-              <a:rPr lang="de-DE" sz="2000" b="0" strike="noStrike" spc="-1" dirty="0" smtClean="0">
-                <a:solidFill>
-                  <a:srgbClr val="000000"/>
-                </a:solidFill>
-                <a:latin typeface="Arial"/>
-                <a:ea typeface="DejaVu Sans"/>
-              </a:rPr>
-              <a:t>5</a:t>
-            </a:r>
-            <a:r>
-              <a:rPr lang="de-DE" sz="2000" spc="-1" dirty="0" smtClean="0">
-                <a:solidFill>
-                  <a:srgbClr val="000000"/>
-                </a:solidFill>
-                <a:latin typeface="Arial"/>
-                <a:ea typeface="DejaVu Sans"/>
-              </a:rPr>
-              <a:t>5</a:t>
-            </a:r>
-            <a:r>
-              <a:rPr lang="de-DE" sz="2000" b="0" strike="noStrike" spc="-1" dirty="0" smtClean="0">
-                <a:solidFill>
-                  <a:srgbClr val="000000"/>
-                </a:solidFill>
-                <a:latin typeface="Arial"/>
-                <a:ea typeface="DejaVu Sans"/>
-              </a:rPr>
-              <a:t>.670,53 </a:t>
+              <a:t>.965,90 </a:t>
             </a:r>
             <a:r>
               <a:rPr lang="de-DE" sz="2000" b="0" strike="noStrike" spc="-1" dirty="0">
@@ -7099,6 +6776,56 @@
               <a:t>KD: </a:t>
             </a:r>
             <a:r>
+              <a:rPr lang="de-DE" sz="2000" b="0" strike="noStrike" spc="-1" dirty="0" smtClean="0">
+                <a:solidFill>
+                  <a:srgbClr val="000000"/>
+                </a:solidFill>
+                <a:latin typeface="Arial"/>
+                <a:ea typeface="DejaVu Sans"/>
+              </a:rPr>
+              <a:t>447</a:t>
+            </a:r>
+            <a:r>
+              <a:rPr lang="de-DE" sz="2000" b="0" strike="noStrike" spc="-1" dirty="0" smtClean="0">
+                <a:solidFill>
+                  <a:srgbClr val="000000"/>
+                </a:solidFill>
+                <a:latin typeface="Arial"/>
+                <a:ea typeface="DejaVu Sans"/>
+              </a:rPr>
+              <a:t>.127,50 </a:t>
+            </a:r>
+            <a:r>
+              <a:rPr lang="de-DE" sz="2000" b="0" strike="noStrike" spc="-1" dirty="0">
+                <a:solidFill>
+                  <a:srgbClr val="000000"/>
+                </a:solidFill>
+                <a:latin typeface="Arial"/>
+                <a:ea typeface="DejaVu Sans"/>
+              </a:rPr>
+              <a:t>€ * </a:t>
+            </a:r>
+            <a:r>
+              <a:rPr lang="de-DE" sz="2000" b="0" strike="noStrike" spc="-1" dirty="0" smtClean="0">
+                <a:solidFill>
+                  <a:srgbClr val="000000"/>
+                </a:solidFill>
+                <a:latin typeface="Arial"/>
+                <a:ea typeface="DejaVu Sans"/>
+              </a:rPr>
+              <a:t>0,28 </a:t>
+            </a:r>
+            <a:r>
+              <a:rPr lang="de-DE" sz="2000" b="0" strike="noStrike" spc="-1" dirty="0">
+                <a:solidFill>
+                  <a:srgbClr val="000000"/>
+                </a:solidFill>
+                <a:latin typeface="Arial"/>
+                <a:ea typeface="DejaVu Sans"/>
+              </a:rPr>
+              <a:t>= </a:t>
+            </a:r>
+            <a:r>
               <a:rPr lang="de-DE" sz="2000" spc="-1" dirty="0" smtClean="0">
                 <a:solidFill>
                   <a:srgbClr val="000000"/>
@@ -7106,7 +6833,7 @@
                 <a:latin typeface="Arial"/>
                 <a:ea typeface="DejaVu Sans"/>
               </a:rPr>
-              <a:t>278</a:t>
+              <a:t>125</a:t>
             </a:r>
             <a:r>
               <a:rPr lang="de-DE" sz="2000" b="0" strike="noStrike" spc="-1" dirty="0" smtClean="0">
@@ -7116,57 +6843,7 @@
                 <a:latin typeface="Arial"/>
                 <a:ea typeface="DejaVu Sans"/>
               </a:rPr>
-              <a:t>.352,64 </a:t>
-            </a:r>
-            <a:r>
-              <a:rPr lang="de-DE" sz="2000" b="0" strike="noStrike" spc="-1" dirty="0">
-                <a:solidFill>
-                  <a:srgbClr val="000000"/>
-                </a:solidFill>
-                <a:latin typeface="Arial"/>
-                <a:ea typeface="DejaVu Sans"/>
-              </a:rPr>
-              <a:t>€ * </a:t>
-            </a:r>
-            <a:r>
-              <a:rPr lang="de-DE" sz="2000" b="0" strike="noStrike" spc="-1" dirty="0" smtClean="0">
-                <a:solidFill>
-                  <a:srgbClr val="000000"/>
-                </a:solidFill>
-                <a:latin typeface="Arial"/>
-                <a:ea typeface="DejaVu Sans"/>
-              </a:rPr>
-              <a:t>0,078 </a:t>
-            </a:r>
-            <a:r>
-              <a:rPr lang="de-DE" sz="2000" b="0" strike="noStrike" spc="-1" dirty="0">
-                <a:solidFill>
-                  <a:srgbClr val="000000"/>
-                </a:solidFill>
-                <a:latin typeface="Arial"/>
-                <a:ea typeface="DejaVu Sans"/>
-              </a:rPr>
-              <a:t>= </a:t>
-            </a:r>
-            <a:r>
-              <a:rPr lang="de-DE" sz="2000" b="0" strike="noStrike" spc="-1" dirty="0" smtClean="0">
-                <a:solidFill>
-                  <a:srgbClr val="000000"/>
-                </a:solidFill>
-                <a:latin typeface="Arial"/>
-                <a:ea typeface="DejaVu Sans"/>
-              </a:rPr>
-              <a:t>21</a:t>
-            </a:r>
-            <a:r>
-              <a:rPr lang="de-DE" sz="2000" b="0" strike="noStrike" spc="-1" dirty="0" smtClean="0">
-                <a:solidFill>
-                  <a:srgbClr val="000000"/>
-                </a:solidFill>
-                <a:latin typeface="Arial"/>
-                <a:ea typeface="DejaVu Sans"/>
-              </a:rPr>
-              <a:t>.711,51 </a:t>
+              <a:t>.195,70 </a:t>
             </a:r>
             <a:r>
               <a:rPr lang="de-DE" sz="2000" b="0" strike="noStrike" spc="-1" dirty="0">
@@ -7252,6 +6929,16 @@
               <a:t>KT: </a:t>
             </a:r>
             <a:r>
+              <a:rPr lang="de-DE" sz="2000" spc="-1" dirty="0" smtClean="0">
+                <a:solidFill>
+                  <a:srgbClr val="000000"/>
+                </a:solidFill>
+                <a:latin typeface="Arial"/>
+                <a:ea typeface="DejaVu Sans"/>
+              </a:rPr>
+              <a:t>9.877,50</a:t>
+            </a:r>
+            <a:r>
               <a:rPr lang="de-DE" sz="2000" b="0" strike="noStrike" spc="-1" dirty="0" smtClean="0">
                 <a:solidFill>
                   <a:srgbClr val="000000"/>
@@ -7259,7 +6946,7 @@
                 <a:latin typeface="Arial"/>
                 <a:ea typeface="DejaVu Sans"/>
               </a:rPr>
-              <a:t>15.200 </a:t>
+              <a:t> </a:t>
             </a:r>
             <a:r>
               <a:rPr lang="de-DE" sz="2000" b="0" strike="noStrike" spc="-1" dirty="0">
@@ -7269,7 +6956,17 @@
                 <a:latin typeface="Arial"/>
                 <a:ea typeface="DejaVu Sans"/>
               </a:rPr>
-              <a:t>€ + 50.000 € + </a:t>
+              <a:t>€ + </a:t>
+            </a:r>
+            <a:r>
+              <a:rPr lang="de-DE" sz="2000" spc="-1" dirty="0" smtClean="0">
+                <a:solidFill>
+                  <a:srgbClr val="000000"/>
+                </a:solidFill>
+                <a:latin typeface="Arial"/>
+                <a:ea typeface="DejaVu Sans"/>
+              </a:rPr>
+              <a:t>35</a:t>
             </a:r>
             <a:r>
               <a:rPr lang="de-DE" sz="2000" b="0" strike="noStrike" spc="-1" dirty="0" smtClean="0">
@@ -7279,7 +6976,77 @@
                 <a:latin typeface="Arial"/>
                 <a:ea typeface="DejaVu Sans"/>
               </a:rPr>
-              <a:t>5</a:t>
+              <a:t>.000 </a:t>
+            </a:r>
+            <a:r>
+              <a:rPr lang="de-DE" sz="2000" b="0" strike="noStrike" spc="-1" dirty="0">
+                <a:solidFill>
+                  <a:srgbClr val="000000"/>
+                </a:solidFill>
+                <a:latin typeface="Arial"/>
+                <a:ea typeface="DejaVu Sans"/>
+              </a:rPr>
+              <a:t>€ + </a:t>
+            </a:r>
+            <a:r>
+              <a:rPr lang="de-DE" sz="2000" b="0" strike="noStrike" spc="-1" dirty="0" smtClean="0">
+                <a:solidFill>
+                  <a:srgbClr val="000000"/>
+                </a:solidFill>
+                <a:latin typeface="Arial"/>
+                <a:ea typeface="DejaVu Sans"/>
+              </a:rPr>
+              <a:t>160.965,90 </a:t>
+            </a:r>
+            <a:r>
+              <a:rPr lang="de-DE" sz="2000" b="0" strike="noStrike" spc="-1" dirty="0">
+                <a:solidFill>
+                  <a:srgbClr val="000000"/>
+                </a:solidFill>
+                <a:latin typeface="Arial"/>
+                <a:ea typeface="DejaVu Sans"/>
+              </a:rPr>
+              <a:t>€ = </a:t>
+            </a:r>
+            <a:r>
+              <a:rPr lang="de-DE" sz="2000" b="0" strike="noStrike" spc="-1" dirty="0" smtClean="0">
+                <a:solidFill>
+                  <a:srgbClr val="000000"/>
+                </a:solidFill>
+                <a:latin typeface="Arial"/>
+                <a:ea typeface="DejaVu Sans"/>
+              </a:rPr>
+              <a:t>205</a:t>
+            </a:r>
+            <a:r>
+              <a:rPr lang="de-DE" sz="2000" b="0" strike="noStrike" spc="-1" dirty="0" smtClean="0">
+                <a:solidFill>
+                  <a:srgbClr val="000000"/>
+                </a:solidFill>
+                <a:latin typeface="Arial"/>
+                <a:ea typeface="DejaVu Sans"/>
+              </a:rPr>
+              <a:t>.843,40 </a:t>
+            </a:r>
+            <a:r>
+              <a:rPr lang="de-DE" sz="2000" b="0" strike="noStrike" spc="-1" dirty="0" smtClean="0">
+                <a:solidFill>
+                  <a:srgbClr val="000000"/>
+                </a:solidFill>
+                <a:latin typeface="Arial"/>
+                <a:ea typeface="DejaVu Sans"/>
+              </a:rPr>
+              <a:t>€ </a:t>
+            </a:r>
+            <a:r>
+              <a:rPr lang="de-DE" sz="2000" b="0" strike="noStrike" spc="-1" dirty="0" smtClean="0">
+                <a:solidFill>
+                  <a:srgbClr val="000000"/>
+                </a:solidFill>
+                <a:latin typeface="Arial"/>
+                <a:ea typeface="DejaVu Sans"/>
+              </a:rPr>
+              <a:t>(</a:t>
             </a:r>
             <a:r>
               <a:rPr lang="de-DE" sz="2000" spc="-1" dirty="0" smtClean="0">
@@ -7289,7 +7056,32 @@
                 <a:latin typeface="Arial"/>
                 <a:ea typeface="DejaVu Sans"/>
               </a:rPr>
-              <a:t>5</a:t>
+              <a:t>Dirk und Sven Fr.) </a:t>
+            </a:r>
+            <a:endParaRPr lang="de-DE" sz="2000" b="0" strike="noStrike" spc="-1" dirty="0">
+              <a:latin typeface="Arial"/>
+            </a:endParaRPr>
+          </a:p>
+          <a:p>
+            <a:r>
+              <a:rPr lang="de-DE" sz="2000" b="0" strike="noStrike" spc="-1" dirty="0">
+                <a:solidFill>
+                  <a:srgbClr val="000000"/>
+                </a:solidFill>
+                <a:latin typeface="Arial"/>
+                <a:ea typeface="DejaVu Sans"/>
+              </a:rPr>
+              <a:t>KD: </a:t>
+            </a:r>
+            <a:r>
+              <a:rPr lang="de-DE" sz="2000" spc="-1" dirty="0" smtClean="0">
+                <a:solidFill>
+                  <a:srgbClr val="000000"/>
+                </a:solidFill>
+                <a:latin typeface="Arial"/>
+                <a:ea typeface="DejaVu Sans"/>
+              </a:rPr>
+              <a:t>7</a:t>
             </a:r>
             <a:r>
               <a:rPr lang="de-DE" sz="2000" b="0" strike="noStrike" spc="-1" dirty="0" smtClean="0">
@@ -7299,7 +7091,7 @@
                 <a:latin typeface="Arial"/>
                 <a:ea typeface="DejaVu Sans"/>
               </a:rPr>
-              <a:t>.670,53 </a:t>
+              <a:t>.245 </a:t>
             </a:r>
             <a:r>
               <a:rPr lang="de-DE" sz="2000" b="0" strike="noStrike" spc="-1" dirty="0">
@@ -7309,19 +7101,29 @@
                 <a:latin typeface="Arial"/>
                 <a:ea typeface="DejaVu Sans"/>
               </a:rPr>
+              <a:t>€ + </a:t>
+            </a:r>
+            <a:r>
+              <a:rPr lang="de-DE" sz="2000" b="0" strike="noStrike" spc="-1" dirty="0" smtClean="0">
+                <a:solidFill>
+                  <a:srgbClr val="000000"/>
+                </a:solidFill>
+                <a:latin typeface="Arial"/>
+                <a:ea typeface="DejaVu Sans"/>
+              </a:rPr>
+              <a:t>125.195,70 </a:t>
+            </a:r>
+            <a:r>
+              <a:rPr lang="de-DE" sz="2000" b="0" strike="noStrike" spc="-1" dirty="0">
+                <a:solidFill>
+                  <a:srgbClr val="000000"/>
+                </a:solidFill>
+                <a:latin typeface="Arial"/>
+                <a:ea typeface="DejaVu Sans"/>
+              </a:rPr>
               <a:t>€ = </a:t>
             </a:r>
             <a:r>
-              <a:rPr lang="de-DE" sz="2000" spc="-1" dirty="0" smtClean="0">
-                <a:solidFill>
-                  <a:srgbClr val="000000"/>
-                </a:solidFill>
-                <a:latin typeface="Arial"/>
-                <a:ea typeface="DejaVu Sans"/>
-              </a:rPr>
-              <a:t>120</a:t>
-            </a:r>
-            <a:r>
               <a:rPr lang="de-DE" sz="2000" b="0" strike="noStrike" spc="-1" dirty="0" smtClean="0">
                 <a:solidFill>
                   <a:srgbClr val="000000"/>
@@ -7329,7 +7131,7 @@
                 <a:latin typeface="Arial"/>
                 <a:ea typeface="DejaVu Sans"/>
               </a:rPr>
-              <a:t>.870,53 </a:t>
+              <a:t>1</a:t>
             </a:r>
             <a:r>
               <a:rPr lang="de-DE" sz="2000" b="0" strike="noStrike" spc="-1" dirty="0" smtClean="0">
@@ -7339,6 +7141,26 @@
                 <a:latin typeface="Arial"/>
                 <a:ea typeface="DejaVu Sans"/>
               </a:rPr>
+              <a:t>32</a:t>
+            </a:r>
+            <a:r>
+              <a:rPr lang="de-DE" sz="2000" b="0" strike="noStrike" spc="-1" dirty="0" smtClean="0">
+                <a:solidFill>
+                  <a:srgbClr val="000000"/>
+                </a:solidFill>
+                <a:latin typeface="Arial"/>
+                <a:ea typeface="DejaVu Sans"/>
+              </a:rPr>
+              <a:t>.440,70 </a:t>
+            </a:r>
+            <a:r>
+              <a:rPr lang="de-DE" sz="2000" b="0" strike="noStrike" spc="-1" dirty="0" smtClean="0">
+                <a:solidFill>
+                  <a:srgbClr val="000000"/>
+                </a:solidFill>
+                <a:latin typeface="Arial"/>
+                <a:ea typeface="DejaVu Sans"/>
+              </a:rPr>
               <a:t>€ </a:t>
             </a:r>
             <a:r>
@@ -7352,37 +7174,6 @@
               <a:t>(</a:t>
             </a:r>
             <a:r>
-              <a:rPr lang="de-DE" sz="2000" spc="-1" dirty="0">
-                <a:solidFill>
-                  <a:srgbClr val="000000"/>
-                </a:solidFill>
-              </a:rPr>
-              <a:t>Heinz-Wilhelm </a:t>
-            </a:r>
-            <a:r>
-              <a:rPr lang="de-DE" sz="2000" spc="-1" dirty="0" smtClean="0">
-                <a:solidFill>
-                  <a:srgbClr val="000000"/>
-                </a:solidFill>
-              </a:rPr>
-              <a:t>Hoyer) </a:t>
-            </a:r>
-            <a:endParaRPr lang="de-DE" sz="2000" b="0" strike="noStrike" spc="-1" dirty="0">
-              <a:latin typeface="Arial"/>
-            </a:endParaRPr>
-          </a:p>
-          <a:p>
-            <a:r>
-              <a:rPr lang="de-DE" sz="2000" b="0" strike="noStrike" spc="-1" dirty="0">
-                <a:solidFill>
-                  <a:srgbClr val="000000"/>
-                </a:solidFill>
-                <a:latin typeface="Arial"/>
-                <a:ea typeface="DejaVu Sans"/>
-              </a:rPr>
-              <a:t>KD: </a:t>
-            </a:r>
-            <a:r>
               <a:rPr lang="de-DE" sz="2000" b="0" strike="noStrike" spc="-1" dirty="0" smtClean="0">
                 <a:solidFill>
                   <a:srgbClr val="000000"/>
@@ -7390,82 +7181,23 @@
                 <a:latin typeface="Arial"/>
                 <a:ea typeface="DejaVu Sans"/>
               </a:rPr>
-              <a:t>5.903,68 </a:t>
-            </a:r>
-            <a:r>
-              <a:rPr lang="de-DE" sz="2000" b="0" strike="noStrike" spc="-1" dirty="0">
-                <a:solidFill>
-                  <a:srgbClr val="000000"/>
-                </a:solidFill>
-                <a:latin typeface="Arial"/>
-                <a:ea typeface="DejaVu Sans"/>
-              </a:rPr>
-              <a:t>€ + </a:t>
-            </a:r>
-            <a:r>
-              <a:rPr lang="de-DE" sz="2000" b="0" strike="noStrike" spc="-1" dirty="0" smtClean="0">
-                <a:solidFill>
-                  <a:srgbClr val="000000"/>
-                </a:solidFill>
-                <a:latin typeface="Arial"/>
-                <a:ea typeface="DejaVu Sans"/>
-              </a:rPr>
-              <a:t>21</a:t>
-            </a:r>
-            <a:r>
-              <a:rPr lang="de-DE" sz="2000" b="0" strike="noStrike" spc="-1" dirty="0" smtClean="0">
-                <a:solidFill>
-                  <a:srgbClr val="000000"/>
-                </a:solidFill>
-                <a:latin typeface="Arial"/>
-                <a:ea typeface="DejaVu Sans"/>
-              </a:rPr>
-              <a:t>.711,51 </a:t>
-            </a:r>
-            <a:r>
-              <a:rPr lang="de-DE" sz="2000" b="0" strike="noStrike" spc="-1" dirty="0">
-                <a:solidFill>
-                  <a:srgbClr val="000000"/>
-                </a:solidFill>
-                <a:latin typeface="Arial"/>
-                <a:ea typeface="DejaVu Sans"/>
-              </a:rPr>
-              <a:t>€ = </a:t>
-            </a:r>
-            <a:r>
-              <a:rPr lang="de-DE" sz="2000" spc="-1" dirty="0" smtClean="0">
-                <a:solidFill>
-                  <a:srgbClr val="000000"/>
-                </a:solidFill>
-                <a:latin typeface="Arial"/>
-                <a:ea typeface="DejaVu Sans"/>
-              </a:rPr>
-              <a:t>27</a:t>
-            </a:r>
-            <a:r>
-              <a:rPr lang="de-DE" sz="2000" b="0" strike="noStrike" spc="-1" dirty="0" smtClean="0">
-                <a:solidFill>
-                  <a:srgbClr val="000000"/>
-                </a:solidFill>
-                <a:latin typeface="Arial"/>
-                <a:ea typeface="DejaVu Sans"/>
-              </a:rPr>
-              <a:t>.615,19 </a:t>
-            </a:r>
-            <a:r>
-              <a:rPr lang="de-DE" sz="2000" b="0" strike="noStrike" spc="-1" dirty="0" smtClean="0">
-                <a:solidFill>
-                  <a:srgbClr val="000000"/>
-                </a:solidFill>
-                <a:latin typeface="Arial"/>
-                <a:ea typeface="DejaVu Sans"/>
-              </a:rPr>
-              <a:t>€ (</a:t>
+              <a:t>Reiner </a:t>
+            </a:r>
+            <a:r>
+              <a:rPr lang="de-DE" sz="2000" b="0" strike="noStrike" spc="-1" dirty="0" err="1" smtClean="0">
+                <a:solidFill>
+                  <a:srgbClr val="000000"/>
+                </a:solidFill>
+                <a:latin typeface="Arial"/>
+                <a:ea typeface="DejaVu Sans"/>
+              </a:rPr>
+              <a:t>Freyberger</a:t>
             </a:r>
             <a:r>
               <a:rPr lang="de-DE" sz="2000" dirty="0" smtClean="0"/>
-              <a:t>Thomas Hoyer, Markus Hoyer)</a:t>
-            </a:r>
+              <a:t>)</a:t>
+            </a:r>
+            <a:endParaRPr lang="de-DE" sz="2000" dirty="0" smtClean="0"/>
           </a:p>
           <a:p>
             <a:pPr>
@@ -7521,7 +7253,7 @@
                                           </p:stCondLst>
                                         </p:cTn>
                                         <p:tgtEl>
-                                          <p:spTgt spid="3">
+                                          <p:spTgt spid="6">
                                             <p:txEl>
                                               <p:pRg st="0" end="0"/>
                                             </p:txEl>
@@ -7552,7 +7284,7 @@
                                           </p:stCondLst>
                                         </p:cTn>
                                         <p:tgtEl>
-                                          <p:spTgt spid="3">
+                                          <p:spTgt spid="6">
                                             <p:txEl>
                                               <p:pRg st="2" end="2"/>
                                             </p:txEl>
@@ -7583,7 +7315,7 @@
                                           </p:stCondLst>
                                         </p:cTn>
                                         <p:tgtEl>
-                                          <p:spTgt spid="3">
+                                          <p:spTgt spid="6">
                                             <p:txEl>
                                               <p:pRg st="3" end="3"/>
                                             </p:txEl>
@@ -7632,7 +7364,7 @@
                                           </p:stCondLst>
                                         </p:cTn>
                                         <p:tgtEl>
-                                          <p:spTgt spid="3">
+                                          <p:spTgt spid="6">
                                             <p:txEl>
                                               <p:pRg st="6" end="6"/>
                                             </p:txEl>
@@ -7663,7 +7395,7 @@
                                           </p:stCondLst>
                                         </p:cTn>
                                         <p:tgtEl>
-                                          <p:spTgt spid="3">
+                                          <p:spTgt spid="6">
                                             <p:txEl>
                                               <p:pRg st="8" end="8"/>
                                             </p:txEl>
@@ -7694,7 +7426,7 @@
                                           </p:stCondLst>
                                         </p:cTn>
                                         <p:tgtEl>
-                                          <p:spTgt spid="3">
+                                          <p:spTgt spid="6">
                                             <p:txEl>
                                               <p:pRg st="9" end="9"/>
                                             </p:txEl>
@@ -7985,8 +7717,8 @@
         </p:nvSpPr>
         <p:spPr>
           <a:xfrm>
-            <a:off x="714348" y="1285866"/>
-            <a:ext cx="7643866" cy="1880280"/>
+            <a:off x="71438" y="1405850"/>
+            <a:ext cx="9001156" cy="1523090"/>
           </a:xfrm>
           <a:prstGeom prst="rect">
             <a:avLst/>
@@ -8038,7 +7770,7 @@
               <a:rPr lang="de-DE" sz="1800" b="0" strike="noStrike" spc="-1" dirty="0" smtClean="0">
                 <a:latin typeface="Arial"/>
               </a:rPr>
-              <a:t>https</a:t>
+              <a:t> https</a:t>
             </a:r>
             <a:r>
               <a:rPr lang="de-DE" sz="1800" b="0" strike="noStrike" spc="-1" dirty="0">
@@ -8059,12 +7791,20 @@
               <a:buChar char="-"/>
             </a:pPr>
             <a:r>
-              <a:rPr lang="de-DE" spc="-1" dirty="0"/>
-              <a:t>https://</a:t>
+              <a:rPr lang="de-DE" spc="-1" dirty="0" smtClean="0">
+                <a:latin typeface="Arial"/>
+              </a:rPr>
+              <a:t> </a:t>
             </a:r>
             <a:r>
               <a:rPr lang="de-DE" spc="-1" dirty="0" smtClean="0"/>
-              <a:t>de.wikipedia.org/wiki/Hoyer_Unternehmensgruppe</a:t>
+              <a:t>https://www.northdata.de/Metzgerei+Freyberger+KG,+N%C3%BCrnberg/HRA+14478</a:t>
+            </a:r>
+            <a:r>
+              <a:rPr lang="de-DE" spc="-1" dirty="0" smtClean="0">
+                <a:latin typeface="Arial"/>
+              </a:rPr>
+              <a:t> </a:t>
             </a:r>
           </a:p>
           <a:p>
@@ -8074,28 +7814,8 @@
             </a:pPr>
             <a:r>
               <a:rPr lang="de-DE" spc="-1" dirty="0" smtClean="0"/>
-              <a:t>https://</a:t>
-            </a:r>
-            <a:r>
-              <a:rPr lang="de-DE" spc="-1" dirty="0" smtClean="0"/>
-              <a:t>www.hoyer-group.com/fileadmin/user_upload/</a:t>
-            </a:r>
-          </a:p>
-          <a:p>
-            <a:r>
-              <a:rPr lang="de-DE" spc="-1" dirty="0" smtClean="0"/>
-              <a:t> HOYER_Unternehmensbericht_2018.pdf</a:t>
-            </a:r>
-            <a:endParaRPr lang="de-DE" sz="1800" b="0" strike="noStrike" spc="-1" dirty="0">
-              <a:latin typeface="Arial"/>
-            </a:endParaRPr>
-          </a:p>
-          <a:p>
-            <a:pPr>
-              <a:lnSpc>
-                <a:spcPct val="100000"/>
-              </a:lnSpc>
-            </a:pPr>
+              <a:t> https://mf58.de</a:t>
+            </a:r>
             <a:endParaRPr lang="de-DE" sz="1800" b="0" strike="noStrike" spc="-1" dirty="0">
               <a:latin typeface="Arial"/>
             </a:endParaRPr>

</xml_diff>